<commit_message>
Updated simcom figure. Fixed the description of simcom games.
</commit_message>
<xml_diff>
--- a/graphics/uevc.pptx
+++ b/graphics/uevc.pptx
@@ -9,6 +9,8 @@
     <p:sldId id="258" r:id="rId3"/>
     <p:sldId id="257" r:id="rId4"/>
     <p:sldId id="259" r:id="rId5"/>
+    <p:sldId id="261" r:id="rId6"/>
+    <p:sldId id="260" r:id="rId7"/>
   </p:sldIdLst>
   <p:sldSz cx="12192000" cy="6858000"/>
   <p:notesSz cx="6858000" cy="9144000"/>
@@ -107,6 +109,11 @@
       </a:defRPr>
     </a:lvl9pPr>
   </p:defaultTextStyle>
+  <p:extLst>
+    <p:ext uri="{EFAFB233-063F-42B5-8137-9DF3F51BA10A}">
+      <p15:sldGuideLst xmlns:p15="http://schemas.microsoft.com/office/powerpoint/2012/main"/>
+    </p:ext>
+  </p:extLst>
 </p:presentation>
 </file>
 
@@ -241,7 +248,7 @@
           <a:p>
             <a:fld id="{FA7B46F1-556D-8B4F-B1E4-A09D33B6D527}" type="datetimeFigureOut">
               <a:rPr lang="en-US" smtClean="0"/>
-              <a:t>3/22/18</a:t>
+              <a:t>3/23/18</a:t>
             </a:fld>
             <a:endParaRPr lang="en-US"/>
           </a:p>
@@ -411,7 +418,7 @@
           <a:p>
             <a:fld id="{FA7B46F1-556D-8B4F-B1E4-A09D33B6D527}" type="datetimeFigureOut">
               <a:rPr lang="en-US" smtClean="0"/>
-              <a:t>3/22/18</a:t>
+              <a:t>3/23/18</a:t>
             </a:fld>
             <a:endParaRPr lang="en-US"/>
           </a:p>
@@ -591,7 +598,7 @@
           <a:p>
             <a:fld id="{FA7B46F1-556D-8B4F-B1E4-A09D33B6D527}" type="datetimeFigureOut">
               <a:rPr lang="en-US" smtClean="0"/>
-              <a:t>3/22/18</a:t>
+              <a:t>3/23/18</a:t>
             </a:fld>
             <a:endParaRPr lang="en-US"/>
           </a:p>
@@ -761,7 +768,7 @@
           <a:p>
             <a:fld id="{FA7B46F1-556D-8B4F-B1E4-A09D33B6D527}" type="datetimeFigureOut">
               <a:rPr lang="en-US" smtClean="0"/>
-              <a:t>3/22/18</a:t>
+              <a:t>3/23/18</a:t>
             </a:fld>
             <a:endParaRPr lang="en-US"/>
           </a:p>
@@ -1007,7 +1014,7 @@
           <a:p>
             <a:fld id="{FA7B46F1-556D-8B4F-B1E4-A09D33B6D527}" type="datetimeFigureOut">
               <a:rPr lang="en-US" smtClean="0"/>
-              <a:t>3/22/18</a:t>
+              <a:t>3/23/18</a:t>
             </a:fld>
             <a:endParaRPr lang="en-US"/>
           </a:p>
@@ -1239,7 +1246,7 @@
           <a:p>
             <a:fld id="{FA7B46F1-556D-8B4F-B1E4-A09D33B6D527}" type="datetimeFigureOut">
               <a:rPr lang="en-US" smtClean="0"/>
-              <a:t>3/22/18</a:t>
+              <a:t>3/23/18</a:t>
             </a:fld>
             <a:endParaRPr lang="en-US"/>
           </a:p>
@@ -1606,7 +1613,7 @@
           <a:p>
             <a:fld id="{FA7B46F1-556D-8B4F-B1E4-A09D33B6D527}" type="datetimeFigureOut">
               <a:rPr lang="en-US" smtClean="0"/>
-              <a:t>3/22/18</a:t>
+              <a:t>3/23/18</a:t>
             </a:fld>
             <a:endParaRPr lang="en-US"/>
           </a:p>
@@ -1724,7 +1731,7 @@
           <a:p>
             <a:fld id="{FA7B46F1-556D-8B4F-B1E4-A09D33B6D527}" type="datetimeFigureOut">
               <a:rPr lang="en-US" smtClean="0"/>
-              <a:t>3/22/18</a:t>
+              <a:t>3/23/18</a:t>
             </a:fld>
             <a:endParaRPr lang="en-US"/>
           </a:p>
@@ -1819,7 +1826,7 @@
           <a:p>
             <a:fld id="{FA7B46F1-556D-8B4F-B1E4-A09D33B6D527}" type="datetimeFigureOut">
               <a:rPr lang="en-US" smtClean="0"/>
-              <a:t>3/22/18</a:t>
+              <a:t>3/23/18</a:t>
             </a:fld>
             <a:endParaRPr lang="en-US"/>
           </a:p>
@@ -2096,7 +2103,7 @@
           <a:p>
             <a:fld id="{FA7B46F1-556D-8B4F-B1E4-A09D33B6D527}" type="datetimeFigureOut">
               <a:rPr lang="en-US" smtClean="0"/>
-              <a:t>3/22/18</a:t>
+              <a:t>3/23/18</a:t>
             </a:fld>
             <a:endParaRPr lang="en-US"/>
           </a:p>
@@ -2349,7 +2356,7 @@
           <a:p>
             <a:fld id="{FA7B46F1-556D-8B4F-B1E4-A09D33B6D527}" type="datetimeFigureOut">
               <a:rPr lang="en-US" smtClean="0"/>
-              <a:t>3/22/18</a:t>
+              <a:t>3/23/18</a:t>
             </a:fld>
             <a:endParaRPr lang="en-US"/>
           </a:p>
@@ -2562,7 +2569,7 @@
           <a:p>
             <a:fld id="{FA7B46F1-556D-8B4F-B1E4-A09D33B6D527}" type="datetimeFigureOut">
               <a:rPr lang="en-US" smtClean="0"/>
-              <a:t>3/22/18</a:t>
+              <a:t>3/23/18</a:t>
             </a:fld>
             <a:endParaRPr lang="en-US"/>
           </a:p>
@@ -6364,6 +6371,3166 @@
     <p:extLst>
       <p:ext uri="{BB962C8B-B14F-4D97-AF65-F5344CB8AC3E}">
         <p14:creationId xmlns:p14="http://schemas.microsoft.com/office/powerpoint/2010/main" val="1831562121"/>
+      </p:ext>
+    </p:extLst>
+  </p:cSld>
+  <p:clrMapOvr>
+    <a:masterClrMapping/>
+  </p:clrMapOvr>
+</p:sld>
+</file>
+
+<file path=ppt/slides/slide5.xml><?xml version="1.0" encoding="utf-8"?>
+<p:sld xmlns:a="http://schemas.openxmlformats.org/drawingml/2006/main" xmlns:r="http://schemas.openxmlformats.org/officeDocument/2006/relationships" xmlns:p="http://schemas.openxmlformats.org/presentationml/2006/main">
+  <p:cSld>
+    <p:spTree>
+      <p:nvGrpSpPr>
+        <p:cNvPr id="1" name=""/>
+        <p:cNvGrpSpPr/>
+        <p:nvPr/>
+      </p:nvGrpSpPr>
+      <p:grpSpPr>
+        <a:xfrm>
+          <a:off x="0" y="0"/>
+          <a:ext cx="0" cy="0"/>
+          <a:chOff x="0" y="0"/>
+          <a:chExt cx="0" cy="0"/>
+        </a:xfrm>
+      </p:grpSpPr>
+      <p:cxnSp>
+        <p:nvCxnSpPr>
+          <p:cNvPr id="84" name="Straight Connector 83"/>
+          <p:cNvCxnSpPr/>
+          <p:nvPr/>
+        </p:nvCxnSpPr>
+        <p:spPr>
+          <a:xfrm>
+            <a:off x="1484834" y="5015363"/>
+            <a:ext cx="6892684" cy="0"/>
+          </a:xfrm>
+          <a:prstGeom prst="line">
+            <a:avLst/>
+          </a:prstGeom>
+          <a:ln w="28575">
+            <a:solidFill>
+              <a:schemeClr val="tx1"/>
+            </a:solidFill>
+          </a:ln>
+        </p:spPr>
+        <p:style>
+          <a:lnRef idx="1">
+            <a:schemeClr val="accent1"/>
+          </a:lnRef>
+          <a:fillRef idx="0">
+            <a:schemeClr val="accent1"/>
+          </a:fillRef>
+          <a:effectRef idx="0">
+            <a:schemeClr val="accent1"/>
+          </a:effectRef>
+          <a:fontRef idx="minor">
+            <a:schemeClr val="tx1"/>
+          </a:fontRef>
+        </p:style>
+      </p:cxnSp>
+      <p:cxnSp>
+        <p:nvCxnSpPr>
+          <p:cNvPr id="34" name="Straight Connector 33"/>
+          <p:cNvCxnSpPr/>
+          <p:nvPr/>
+        </p:nvCxnSpPr>
+        <p:spPr>
+          <a:xfrm flipV="1">
+            <a:off x="1653905" y="4116041"/>
+            <a:ext cx="6723613" cy="19891"/>
+          </a:xfrm>
+          <a:prstGeom prst="line">
+            <a:avLst/>
+          </a:prstGeom>
+          <a:ln w="28575">
+            <a:solidFill>
+              <a:schemeClr val="tx1"/>
+            </a:solidFill>
+          </a:ln>
+        </p:spPr>
+        <p:style>
+          <a:lnRef idx="1">
+            <a:schemeClr val="accent1"/>
+          </a:lnRef>
+          <a:fillRef idx="0">
+            <a:schemeClr val="accent1"/>
+          </a:fillRef>
+          <a:effectRef idx="0">
+            <a:schemeClr val="accent1"/>
+          </a:effectRef>
+          <a:fontRef idx="minor">
+            <a:schemeClr val="tx1"/>
+          </a:fontRef>
+        </p:style>
+      </p:cxnSp>
+      <p:cxnSp>
+        <p:nvCxnSpPr>
+          <p:cNvPr id="23" name="Straight Connector 22"/>
+          <p:cNvCxnSpPr/>
+          <p:nvPr/>
+        </p:nvCxnSpPr>
+        <p:spPr>
+          <a:xfrm flipV="1">
+            <a:off x="1525569" y="2965525"/>
+            <a:ext cx="6851949" cy="192"/>
+          </a:xfrm>
+          <a:prstGeom prst="line">
+            <a:avLst/>
+          </a:prstGeom>
+          <a:ln w="28575">
+            <a:solidFill>
+              <a:schemeClr val="tx1"/>
+            </a:solidFill>
+          </a:ln>
+        </p:spPr>
+        <p:style>
+          <a:lnRef idx="1">
+            <a:schemeClr val="accent1"/>
+          </a:lnRef>
+          <a:fillRef idx="0">
+            <a:schemeClr val="accent1"/>
+          </a:fillRef>
+          <a:effectRef idx="0">
+            <a:schemeClr val="accent1"/>
+          </a:effectRef>
+          <a:fontRef idx="minor">
+            <a:schemeClr val="tx1"/>
+          </a:fontRef>
+        </p:style>
+      </p:cxnSp>
+      <p:cxnSp>
+        <p:nvCxnSpPr>
+          <p:cNvPr id="24" name="Straight Connector 23"/>
+          <p:cNvCxnSpPr/>
+          <p:nvPr/>
+        </p:nvCxnSpPr>
+        <p:spPr>
+          <a:xfrm flipV="1">
+            <a:off x="1653905" y="3272947"/>
+            <a:ext cx="6723613" cy="10820"/>
+          </a:xfrm>
+          <a:prstGeom prst="line">
+            <a:avLst/>
+          </a:prstGeom>
+          <a:ln w="28575">
+            <a:solidFill>
+              <a:schemeClr val="tx1"/>
+            </a:solidFill>
+          </a:ln>
+        </p:spPr>
+        <p:style>
+          <a:lnRef idx="1">
+            <a:schemeClr val="accent1"/>
+          </a:lnRef>
+          <a:fillRef idx="0">
+            <a:schemeClr val="accent1"/>
+          </a:fillRef>
+          <a:effectRef idx="0">
+            <a:schemeClr val="accent1"/>
+          </a:effectRef>
+          <a:fontRef idx="minor">
+            <a:schemeClr val="tx1"/>
+          </a:fontRef>
+        </p:style>
+      </p:cxnSp>
+      <p:cxnSp>
+        <p:nvCxnSpPr>
+          <p:cNvPr id="44" name="Straight Connector 43"/>
+          <p:cNvCxnSpPr/>
+          <p:nvPr/>
+        </p:nvCxnSpPr>
+        <p:spPr>
+          <a:xfrm>
+            <a:off x="1629641" y="4455322"/>
+            <a:ext cx="6747877" cy="0"/>
+          </a:xfrm>
+          <a:prstGeom prst="line">
+            <a:avLst/>
+          </a:prstGeom>
+          <a:ln w="28575">
+            <a:solidFill>
+              <a:schemeClr val="tx1"/>
+            </a:solidFill>
+          </a:ln>
+        </p:spPr>
+        <p:style>
+          <a:lnRef idx="1">
+            <a:schemeClr val="accent1"/>
+          </a:lnRef>
+          <a:fillRef idx="0">
+            <a:schemeClr val="accent1"/>
+          </a:fillRef>
+          <a:effectRef idx="0">
+            <a:schemeClr val="accent1"/>
+          </a:effectRef>
+          <a:fontRef idx="minor">
+            <a:schemeClr val="tx1"/>
+          </a:fontRef>
+        </p:style>
+      </p:cxnSp>
+      <p:cxnSp>
+        <p:nvCxnSpPr>
+          <p:cNvPr id="17" name="Straight Connector 16"/>
+          <p:cNvCxnSpPr/>
+          <p:nvPr/>
+        </p:nvCxnSpPr>
+        <p:spPr>
+          <a:xfrm>
+            <a:off x="1491279" y="1359998"/>
+            <a:ext cx="6886239" cy="30480"/>
+          </a:xfrm>
+          <a:prstGeom prst="line">
+            <a:avLst/>
+          </a:prstGeom>
+          <a:ln w="28575">
+            <a:solidFill>
+              <a:schemeClr val="tx1"/>
+            </a:solidFill>
+          </a:ln>
+        </p:spPr>
+        <p:style>
+          <a:lnRef idx="1">
+            <a:schemeClr val="accent1"/>
+          </a:lnRef>
+          <a:fillRef idx="0">
+            <a:schemeClr val="accent1"/>
+          </a:fillRef>
+          <a:effectRef idx="0">
+            <a:schemeClr val="accent1"/>
+          </a:effectRef>
+          <a:fontRef idx="minor">
+            <a:schemeClr val="tx1"/>
+          </a:fontRef>
+        </p:style>
+      </p:cxnSp>
+      <p:cxnSp>
+        <p:nvCxnSpPr>
+          <p:cNvPr id="18" name="Straight Connector 17"/>
+          <p:cNvCxnSpPr/>
+          <p:nvPr/>
+        </p:nvCxnSpPr>
+        <p:spPr>
+          <a:xfrm>
+            <a:off x="1491279" y="1737478"/>
+            <a:ext cx="6886239" cy="28878"/>
+          </a:xfrm>
+          <a:prstGeom prst="line">
+            <a:avLst/>
+          </a:prstGeom>
+          <a:ln w="28575">
+            <a:solidFill>
+              <a:schemeClr val="tx1"/>
+            </a:solidFill>
+          </a:ln>
+        </p:spPr>
+        <p:style>
+          <a:lnRef idx="1">
+            <a:schemeClr val="accent1"/>
+          </a:lnRef>
+          <a:fillRef idx="0">
+            <a:schemeClr val="accent1"/>
+          </a:fillRef>
+          <a:effectRef idx="0">
+            <a:schemeClr val="accent1"/>
+          </a:effectRef>
+          <a:fontRef idx="minor">
+            <a:schemeClr val="tx1"/>
+          </a:fontRef>
+        </p:style>
+      </p:cxnSp>
+      <p:cxnSp>
+        <p:nvCxnSpPr>
+          <p:cNvPr id="19" name="Straight Connector 18"/>
+          <p:cNvCxnSpPr/>
+          <p:nvPr/>
+        </p:nvCxnSpPr>
+        <p:spPr>
+          <a:xfrm>
+            <a:off x="1491279" y="2134440"/>
+            <a:ext cx="6886239" cy="25241"/>
+          </a:xfrm>
+          <a:prstGeom prst="line">
+            <a:avLst/>
+          </a:prstGeom>
+          <a:ln w="28575">
+            <a:solidFill>
+              <a:schemeClr val="tx1"/>
+            </a:solidFill>
+          </a:ln>
+        </p:spPr>
+        <p:style>
+          <a:lnRef idx="1">
+            <a:schemeClr val="accent1"/>
+          </a:lnRef>
+          <a:fillRef idx="0">
+            <a:schemeClr val="accent1"/>
+          </a:fillRef>
+          <a:effectRef idx="0">
+            <a:schemeClr val="accent1"/>
+          </a:effectRef>
+          <a:fontRef idx="minor">
+            <a:schemeClr val="tx1"/>
+          </a:fontRef>
+        </p:style>
+      </p:cxnSp>
+      <p:cxnSp>
+        <p:nvCxnSpPr>
+          <p:cNvPr id="20" name="Straight Connector 19"/>
+          <p:cNvCxnSpPr/>
+          <p:nvPr/>
+        </p:nvCxnSpPr>
+        <p:spPr>
+          <a:xfrm>
+            <a:off x="1525569" y="2560438"/>
+            <a:ext cx="6851949" cy="0"/>
+          </a:xfrm>
+          <a:prstGeom prst="line">
+            <a:avLst/>
+          </a:prstGeom>
+          <a:ln w="28575">
+            <a:solidFill>
+              <a:schemeClr val="tx1"/>
+            </a:solidFill>
+          </a:ln>
+        </p:spPr>
+        <p:style>
+          <a:lnRef idx="1">
+            <a:schemeClr val="accent1"/>
+          </a:lnRef>
+          <a:fillRef idx="0">
+            <a:schemeClr val="accent1"/>
+          </a:fillRef>
+          <a:effectRef idx="0">
+            <a:schemeClr val="accent1"/>
+          </a:effectRef>
+          <a:fontRef idx="minor">
+            <a:schemeClr val="tx1"/>
+          </a:fontRef>
+        </p:style>
+      </p:cxnSp>
+      <p:cxnSp>
+        <p:nvCxnSpPr>
+          <p:cNvPr id="22" name="Straight Connector 21"/>
+          <p:cNvCxnSpPr/>
+          <p:nvPr/>
+        </p:nvCxnSpPr>
+        <p:spPr>
+          <a:xfrm>
+            <a:off x="1484834" y="4715045"/>
+            <a:ext cx="6892684" cy="0"/>
+          </a:xfrm>
+          <a:prstGeom prst="line">
+            <a:avLst/>
+          </a:prstGeom>
+          <a:ln w="28575">
+            <a:solidFill>
+              <a:schemeClr val="tx1"/>
+            </a:solidFill>
+          </a:ln>
+        </p:spPr>
+        <p:style>
+          <a:lnRef idx="1">
+            <a:schemeClr val="accent1"/>
+          </a:lnRef>
+          <a:fillRef idx="0">
+            <a:schemeClr val="accent1"/>
+          </a:fillRef>
+          <a:effectRef idx="0">
+            <a:schemeClr val="accent1"/>
+          </a:effectRef>
+          <a:fontRef idx="minor">
+            <a:schemeClr val="tx1"/>
+          </a:fontRef>
+        </p:style>
+      </p:cxnSp>
+      <p:sp>
+        <p:nvSpPr>
+          <p:cNvPr id="9" name="Rectangle 8"/>
+          <p:cNvSpPr/>
+          <p:nvPr/>
+        </p:nvSpPr>
+        <p:spPr>
+          <a:xfrm>
+            <a:off x="3943898" y="3742395"/>
+            <a:ext cx="1120140" cy="1484596"/>
+          </a:xfrm>
+          <a:prstGeom prst="rect">
+            <a:avLst/>
+          </a:prstGeom>
+          <a:solidFill>
+            <a:schemeClr val="bg1"/>
+          </a:solidFill>
+          <a:ln w="28575">
+            <a:solidFill>
+              <a:schemeClr val="tx1"/>
+            </a:solidFill>
+          </a:ln>
+        </p:spPr>
+        <p:style>
+          <a:lnRef idx="2">
+            <a:schemeClr val="accent1">
+              <a:shade val="50000"/>
+            </a:schemeClr>
+          </a:lnRef>
+          <a:fillRef idx="1">
+            <a:schemeClr val="accent1"/>
+          </a:fillRef>
+          <a:effectRef idx="0">
+            <a:schemeClr val="accent1"/>
+          </a:effectRef>
+          <a:fontRef idx="minor">
+            <a:schemeClr val="lt1"/>
+          </a:fontRef>
+        </p:style>
+        <p:txBody>
+          <a:bodyPr rtlCol="0" anchor="ctr"/>
+          <a:lstStyle/>
+          <a:p>
+            <a:pPr algn="ctr"/>
+            <a:endParaRPr lang="en-US"/>
+          </a:p>
+        </p:txBody>
+      </p:sp>
+      <p:sp>
+        <p:nvSpPr>
+          <p:cNvPr id="11" name="Rectangle 10"/>
+          <p:cNvSpPr/>
+          <p:nvPr/>
+        </p:nvSpPr>
+        <p:spPr>
+          <a:xfrm>
+            <a:off x="7146352" y="1582344"/>
+            <a:ext cx="1120140" cy="1203991"/>
+          </a:xfrm>
+          <a:prstGeom prst="rect">
+            <a:avLst/>
+          </a:prstGeom>
+          <a:solidFill>
+            <a:schemeClr val="bg1"/>
+          </a:solidFill>
+          <a:ln w="28575">
+            <a:solidFill>
+              <a:schemeClr val="tx1"/>
+            </a:solidFill>
+          </a:ln>
+        </p:spPr>
+        <p:style>
+          <a:lnRef idx="2">
+            <a:schemeClr val="accent1">
+              <a:shade val="50000"/>
+            </a:schemeClr>
+          </a:lnRef>
+          <a:fillRef idx="1">
+            <a:schemeClr val="accent1"/>
+          </a:fillRef>
+          <a:effectRef idx="0">
+            <a:schemeClr val="accent1"/>
+          </a:effectRef>
+          <a:fontRef idx="minor">
+            <a:schemeClr val="lt1"/>
+          </a:fontRef>
+        </p:style>
+        <p:txBody>
+          <a:bodyPr rtlCol="0" anchor="ctr"/>
+          <a:lstStyle/>
+          <a:p>
+            <a:pPr algn="ctr"/>
+            <a:endParaRPr lang="en-US"/>
+          </a:p>
+        </p:txBody>
+      </p:sp>
+      <p:pic>
+        <p:nvPicPr>
+          <p:cNvPr id="12" name="Picture 11"/>
+          <p:cNvPicPr>
+            <a:picLocks noChangeAspect="1"/>
+          </p:cNvPicPr>
+          <p:nvPr/>
+        </p:nvPicPr>
+        <p:blipFill>
+          <a:blip r:embed="rId2"/>
+          <a:stretch>
+            <a:fillRect/>
+          </a:stretch>
+        </p:blipFill>
+        <p:spPr>
+          <a:xfrm>
+            <a:off x="7420672" y="1980281"/>
+            <a:ext cx="571500" cy="406400"/>
+          </a:xfrm>
+          <a:prstGeom prst="rect">
+            <a:avLst/>
+          </a:prstGeom>
+        </p:spPr>
+      </p:pic>
+      <p:pic>
+        <p:nvPicPr>
+          <p:cNvPr id="13" name="Picture 12"/>
+          <p:cNvPicPr>
+            <a:picLocks noChangeAspect="1"/>
+          </p:cNvPicPr>
+          <p:nvPr/>
+        </p:nvPicPr>
+        <p:blipFill>
+          <a:blip r:embed="rId3"/>
+          <a:stretch>
+            <a:fillRect/>
+          </a:stretch>
+        </p:blipFill>
+        <p:spPr>
+          <a:xfrm>
+            <a:off x="4297144" y="4273593"/>
+            <a:ext cx="342900" cy="317500"/>
+          </a:xfrm>
+          <a:prstGeom prst="rect">
+            <a:avLst/>
+          </a:prstGeom>
+        </p:spPr>
+      </p:pic>
+      <p:cxnSp>
+        <p:nvCxnSpPr>
+          <p:cNvPr id="25" name="Straight Connector 24"/>
+          <p:cNvCxnSpPr/>
+          <p:nvPr/>
+        </p:nvCxnSpPr>
+        <p:spPr>
+          <a:xfrm flipV="1">
+            <a:off x="1389919" y="2965718"/>
+            <a:ext cx="143718" cy="318048"/>
+          </a:xfrm>
+          <a:prstGeom prst="line">
+            <a:avLst/>
+          </a:prstGeom>
+          <a:ln w="28575">
+            <a:solidFill>
+              <a:schemeClr val="tx1"/>
+            </a:solidFill>
+          </a:ln>
+        </p:spPr>
+        <p:style>
+          <a:lnRef idx="1">
+            <a:schemeClr val="accent1"/>
+          </a:lnRef>
+          <a:fillRef idx="0">
+            <a:schemeClr val="accent1"/>
+          </a:fillRef>
+          <a:effectRef idx="0">
+            <a:schemeClr val="accent1"/>
+          </a:effectRef>
+          <a:fontRef idx="minor">
+            <a:schemeClr val="tx1"/>
+          </a:fontRef>
+        </p:style>
+      </p:cxnSp>
+      <p:cxnSp>
+        <p:nvCxnSpPr>
+          <p:cNvPr id="26" name="Straight Connector 25"/>
+          <p:cNvCxnSpPr/>
+          <p:nvPr/>
+        </p:nvCxnSpPr>
+        <p:spPr>
+          <a:xfrm flipV="1">
+            <a:off x="1484834" y="3283768"/>
+            <a:ext cx="180500" cy="758982"/>
+          </a:xfrm>
+          <a:prstGeom prst="line">
+            <a:avLst/>
+          </a:prstGeom>
+          <a:ln w="28575">
+            <a:solidFill>
+              <a:schemeClr val="tx1"/>
+            </a:solidFill>
+          </a:ln>
+        </p:spPr>
+        <p:style>
+          <a:lnRef idx="1">
+            <a:schemeClr val="accent1"/>
+          </a:lnRef>
+          <a:fillRef idx="0">
+            <a:schemeClr val="accent1"/>
+          </a:fillRef>
+          <a:effectRef idx="0">
+            <a:schemeClr val="accent1"/>
+          </a:effectRef>
+          <a:fontRef idx="minor">
+            <a:schemeClr val="tx1"/>
+          </a:fontRef>
+        </p:style>
+      </p:cxnSp>
+      <p:cxnSp>
+        <p:nvCxnSpPr>
+          <p:cNvPr id="30" name="Straight Connector 29"/>
+          <p:cNvCxnSpPr/>
+          <p:nvPr/>
+        </p:nvCxnSpPr>
+        <p:spPr>
+          <a:xfrm flipH="1" flipV="1">
+            <a:off x="1383606" y="3277320"/>
+            <a:ext cx="290347" cy="872136"/>
+          </a:xfrm>
+          <a:prstGeom prst="line">
+            <a:avLst/>
+          </a:prstGeom>
+          <a:ln w="28575">
+            <a:solidFill>
+              <a:schemeClr val="tx1"/>
+            </a:solidFill>
+          </a:ln>
+        </p:spPr>
+        <p:style>
+          <a:lnRef idx="1">
+            <a:schemeClr val="accent1"/>
+          </a:lnRef>
+          <a:fillRef idx="0">
+            <a:schemeClr val="accent1"/>
+          </a:fillRef>
+          <a:effectRef idx="0">
+            <a:schemeClr val="accent1"/>
+          </a:effectRef>
+          <a:fontRef idx="minor">
+            <a:schemeClr val="tx1"/>
+          </a:fontRef>
+        </p:style>
+      </p:cxnSp>
+      <p:cxnSp>
+        <p:nvCxnSpPr>
+          <p:cNvPr id="39" name="Straight Connector 38"/>
+          <p:cNvCxnSpPr/>
+          <p:nvPr/>
+        </p:nvCxnSpPr>
+        <p:spPr>
+          <a:xfrm flipH="1" flipV="1">
+            <a:off x="1476215" y="4003647"/>
+            <a:ext cx="153426" cy="451675"/>
+          </a:xfrm>
+          <a:prstGeom prst="line">
+            <a:avLst/>
+          </a:prstGeom>
+          <a:ln w="28575">
+            <a:solidFill>
+              <a:schemeClr val="tx1"/>
+            </a:solidFill>
+          </a:ln>
+        </p:spPr>
+        <p:style>
+          <a:lnRef idx="1">
+            <a:schemeClr val="accent1"/>
+          </a:lnRef>
+          <a:fillRef idx="0">
+            <a:schemeClr val="accent1"/>
+          </a:fillRef>
+          <a:effectRef idx="0">
+            <a:schemeClr val="accent1"/>
+          </a:effectRef>
+          <a:fontRef idx="minor">
+            <a:schemeClr val="tx1"/>
+          </a:fontRef>
+        </p:style>
+      </p:cxnSp>
+      <p:pic>
+        <p:nvPicPr>
+          <p:cNvPr id="105" name="Picture 104"/>
+          <p:cNvPicPr>
+            <a:picLocks noChangeAspect="1"/>
+          </p:cNvPicPr>
+          <p:nvPr/>
+        </p:nvPicPr>
+        <p:blipFill>
+          <a:blip r:embed="rId4"/>
+          <a:stretch>
+            <a:fillRect/>
+          </a:stretch>
+        </p:blipFill>
+        <p:spPr>
+          <a:xfrm>
+            <a:off x="973494" y="4614341"/>
+            <a:ext cx="165100" cy="228600"/>
+          </a:xfrm>
+          <a:prstGeom prst="rect">
+            <a:avLst/>
+          </a:prstGeom>
+        </p:spPr>
+      </p:pic>
+      <p:sp>
+        <p:nvSpPr>
+          <p:cNvPr id="32" name="Rectangle 31"/>
+          <p:cNvSpPr/>
+          <p:nvPr/>
+        </p:nvSpPr>
+        <p:spPr>
+          <a:xfrm>
+            <a:off x="1702809" y="1582344"/>
+            <a:ext cx="1120140" cy="1204287"/>
+          </a:xfrm>
+          <a:prstGeom prst="rect">
+            <a:avLst/>
+          </a:prstGeom>
+          <a:solidFill>
+            <a:schemeClr val="bg1"/>
+          </a:solidFill>
+          <a:ln w="28575">
+            <a:solidFill>
+              <a:schemeClr val="tx1"/>
+            </a:solidFill>
+          </a:ln>
+        </p:spPr>
+        <p:style>
+          <a:lnRef idx="2">
+            <a:schemeClr val="accent1">
+              <a:shade val="50000"/>
+            </a:schemeClr>
+          </a:lnRef>
+          <a:fillRef idx="1">
+            <a:schemeClr val="accent1"/>
+          </a:fillRef>
+          <a:effectRef idx="0">
+            <a:schemeClr val="accent1"/>
+          </a:effectRef>
+          <a:fontRef idx="minor">
+            <a:schemeClr val="lt1"/>
+          </a:fontRef>
+        </p:style>
+        <p:txBody>
+          <a:bodyPr rtlCol="0" anchor="ctr"/>
+          <a:lstStyle/>
+          <a:p>
+            <a:pPr algn="ctr"/>
+            <a:endParaRPr lang="en-US"/>
+          </a:p>
+        </p:txBody>
+      </p:sp>
+      <p:pic>
+        <p:nvPicPr>
+          <p:cNvPr id="33" name="Picture 32"/>
+          <p:cNvPicPr>
+            <a:picLocks noChangeAspect="1"/>
+          </p:cNvPicPr>
+          <p:nvPr/>
+        </p:nvPicPr>
+        <p:blipFill>
+          <a:blip r:embed="rId5"/>
+          <a:stretch>
+            <a:fillRect/>
+          </a:stretch>
+        </p:blipFill>
+        <p:spPr>
+          <a:xfrm>
+            <a:off x="1987489" y="1986275"/>
+            <a:ext cx="584200" cy="457200"/>
+          </a:xfrm>
+          <a:prstGeom prst="rect">
+            <a:avLst/>
+          </a:prstGeom>
+        </p:spPr>
+      </p:pic>
+      <p:cxnSp>
+        <p:nvCxnSpPr>
+          <p:cNvPr id="6" name="Straight Connector 5"/>
+          <p:cNvCxnSpPr/>
+          <p:nvPr/>
+        </p:nvCxnSpPr>
+        <p:spPr>
+          <a:xfrm flipH="1">
+            <a:off x="5799008" y="2560438"/>
+            <a:ext cx="7185" cy="723328"/>
+          </a:xfrm>
+          <a:prstGeom prst="line">
+            <a:avLst/>
+          </a:prstGeom>
+          <a:ln w="38100">
+            <a:solidFill>
+              <a:schemeClr val="tx1"/>
+            </a:solidFill>
+          </a:ln>
+        </p:spPr>
+        <p:style>
+          <a:lnRef idx="1">
+            <a:schemeClr val="accent1"/>
+          </a:lnRef>
+          <a:fillRef idx="0">
+            <a:schemeClr val="accent1"/>
+          </a:fillRef>
+          <a:effectRef idx="0">
+            <a:schemeClr val="accent1"/>
+          </a:effectRef>
+          <a:fontRef idx="minor">
+            <a:schemeClr val="tx1"/>
+          </a:fontRef>
+        </p:style>
+      </p:cxnSp>
+      <p:cxnSp>
+        <p:nvCxnSpPr>
+          <p:cNvPr id="42" name="Straight Connector 41"/>
+          <p:cNvCxnSpPr/>
+          <p:nvPr/>
+        </p:nvCxnSpPr>
+        <p:spPr>
+          <a:xfrm flipH="1">
+            <a:off x="5718063" y="2454133"/>
+            <a:ext cx="169709" cy="229185"/>
+          </a:xfrm>
+          <a:prstGeom prst="line">
+            <a:avLst/>
+          </a:prstGeom>
+          <a:ln w="38100">
+            <a:solidFill>
+              <a:schemeClr val="tx1"/>
+            </a:solidFill>
+          </a:ln>
+        </p:spPr>
+        <p:style>
+          <a:lnRef idx="1">
+            <a:schemeClr val="accent1"/>
+          </a:lnRef>
+          <a:fillRef idx="0">
+            <a:schemeClr val="accent1"/>
+          </a:fillRef>
+          <a:effectRef idx="0">
+            <a:schemeClr val="accent1"/>
+          </a:effectRef>
+          <a:fontRef idx="minor">
+            <a:schemeClr val="tx1"/>
+          </a:fontRef>
+        </p:style>
+      </p:cxnSp>
+      <p:cxnSp>
+        <p:nvCxnSpPr>
+          <p:cNvPr id="72" name="Straight Connector 71"/>
+          <p:cNvCxnSpPr/>
+          <p:nvPr/>
+        </p:nvCxnSpPr>
+        <p:spPr>
+          <a:xfrm flipH="1">
+            <a:off x="5721338" y="3169174"/>
+            <a:ext cx="169709" cy="229185"/>
+          </a:xfrm>
+          <a:prstGeom prst="line">
+            <a:avLst/>
+          </a:prstGeom>
+          <a:ln w="38100">
+            <a:solidFill>
+              <a:schemeClr val="tx1"/>
+            </a:solidFill>
+          </a:ln>
+        </p:spPr>
+        <p:style>
+          <a:lnRef idx="1">
+            <a:schemeClr val="accent1"/>
+          </a:lnRef>
+          <a:fillRef idx="0">
+            <a:schemeClr val="accent1"/>
+          </a:fillRef>
+          <a:effectRef idx="0">
+            <a:schemeClr val="accent1"/>
+          </a:effectRef>
+          <a:fontRef idx="minor">
+            <a:schemeClr val="tx1"/>
+          </a:fontRef>
+        </p:style>
+      </p:cxnSp>
+      <p:cxnSp>
+        <p:nvCxnSpPr>
+          <p:cNvPr id="73" name="Straight Connector 72"/>
+          <p:cNvCxnSpPr/>
+          <p:nvPr/>
+        </p:nvCxnSpPr>
+        <p:spPr>
+          <a:xfrm flipH="1" flipV="1">
+            <a:off x="5698370" y="3186673"/>
+            <a:ext cx="189402" cy="199924"/>
+          </a:xfrm>
+          <a:prstGeom prst="line">
+            <a:avLst/>
+          </a:prstGeom>
+          <a:ln w="38100">
+            <a:solidFill>
+              <a:schemeClr val="tx1"/>
+            </a:solidFill>
+          </a:ln>
+        </p:spPr>
+        <p:style>
+          <a:lnRef idx="1">
+            <a:schemeClr val="accent1"/>
+          </a:lnRef>
+          <a:fillRef idx="0">
+            <a:schemeClr val="accent1"/>
+          </a:fillRef>
+          <a:effectRef idx="0">
+            <a:schemeClr val="accent1"/>
+          </a:effectRef>
+          <a:fontRef idx="minor">
+            <a:schemeClr val="tx1"/>
+          </a:fontRef>
+        </p:style>
+      </p:cxnSp>
+      <p:cxnSp>
+        <p:nvCxnSpPr>
+          <p:cNvPr id="75" name="Straight Connector 74"/>
+          <p:cNvCxnSpPr/>
+          <p:nvPr/>
+        </p:nvCxnSpPr>
+        <p:spPr>
+          <a:xfrm flipH="1" flipV="1">
+            <a:off x="5715330" y="2468763"/>
+            <a:ext cx="189402" cy="199924"/>
+          </a:xfrm>
+          <a:prstGeom prst="line">
+            <a:avLst/>
+          </a:prstGeom>
+          <a:ln w="38100">
+            <a:solidFill>
+              <a:schemeClr val="tx1"/>
+            </a:solidFill>
+          </a:ln>
+        </p:spPr>
+        <p:style>
+          <a:lnRef idx="1">
+            <a:schemeClr val="accent1"/>
+          </a:lnRef>
+          <a:fillRef idx="0">
+            <a:schemeClr val="accent1"/>
+          </a:fillRef>
+          <a:effectRef idx="0">
+            <a:schemeClr val="accent1"/>
+          </a:effectRef>
+          <a:fontRef idx="minor">
+            <a:schemeClr val="tx1"/>
+          </a:fontRef>
+        </p:style>
+      </p:cxnSp>
+      <p:pic>
+        <p:nvPicPr>
+          <p:cNvPr id="114" name="Picture 113"/>
+          <p:cNvPicPr>
+            <a:picLocks noChangeAspect="1"/>
+          </p:cNvPicPr>
+          <p:nvPr/>
+        </p:nvPicPr>
+        <p:blipFill>
+          <a:blip r:embed="rId6"/>
+          <a:stretch>
+            <a:fillRect/>
+          </a:stretch>
+        </p:blipFill>
+        <p:spPr>
+          <a:xfrm>
+            <a:off x="968776" y="2849382"/>
+            <a:ext cx="266700" cy="279400"/>
+          </a:xfrm>
+          <a:prstGeom prst="rect">
+            <a:avLst/>
+          </a:prstGeom>
+        </p:spPr>
+      </p:pic>
+      <p:pic>
+        <p:nvPicPr>
+          <p:cNvPr id="115" name="Picture 114"/>
+          <p:cNvPicPr>
+            <a:picLocks noChangeAspect="1"/>
+          </p:cNvPicPr>
+          <p:nvPr/>
+        </p:nvPicPr>
+        <p:blipFill>
+          <a:blip r:embed="rId7"/>
+          <a:stretch>
+            <a:fillRect/>
+          </a:stretch>
+        </p:blipFill>
+        <p:spPr>
+          <a:xfrm>
+            <a:off x="974364" y="3210034"/>
+            <a:ext cx="279400" cy="279400"/>
+          </a:xfrm>
+          <a:prstGeom prst="rect">
+            <a:avLst/>
+          </a:prstGeom>
+        </p:spPr>
+      </p:pic>
+      <p:sp>
+        <p:nvSpPr>
+          <p:cNvPr id="38" name="Rectangle 37"/>
+          <p:cNvSpPr/>
+          <p:nvPr/>
+        </p:nvSpPr>
+        <p:spPr>
+          <a:xfrm>
+            <a:off x="3005234" y="2327444"/>
+            <a:ext cx="736967" cy="817463"/>
+          </a:xfrm>
+          <a:prstGeom prst="rect">
+            <a:avLst/>
+          </a:prstGeom>
+          <a:solidFill>
+            <a:schemeClr val="bg1"/>
+          </a:solidFill>
+          <a:ln w="28575">
+            <a:solidFill>
+              <a:schemeClr val="tx1"/>
+            </a:solidFill>
+          </a:ln>
+        </p:spPr>
+        <p:style>
+          <a:lnRef idx="2">
+            <a:schemeClr val="accent1">
+              <a:shade val="50000"/>
+            </a:schemeClr>
+          </a:lnRef>
+          <a:fillRef idx="1">
+            <a:schemeClr val="accent1"/>
+          </a:fillRef>
+          <a:effectRef idx="0">
+            <a:schemeClr val="accent1"/>
+          </a:effectRef>
+          <a:fontRef idx="minor">
+            <a:schemeClr val="lt1"/>
+          </a:fontRef>
+        </p:style>
+        <p:txBody>
+          <a:bodyPr rtlCol="0" anchor="ctr"/>
+          <a:lstStyle/>
+          <a:p>
+            <a:pPr algn="ctr"/>
+            <a:endParaRPr lang="en-US"/>
+          </a:p>
+        </p:txBody>
+      </p:sp>
+      <p:cxnSp>
+        <p:nvCxnSpPr>
+          <p:cNvPr id="41" name="Straight Connector 40"/>
+          <p:cNvCxnSpPr>
+            <a:stCxn id="38" idx="0"/>
+          </p:cNvCxnSpPr>
+          <p:nvPr/>
+        </p:nvCxnSpPr>
+        <p:spPr>
+          <a:xfrm flipH="1" flipV="1">
+            <a:off x="3371669" y="1369358"/>
+            <a:ext cx="2049" cy="958086"/>
+          </a:xfrm>
+          <a:prstGeom prst="line">
+            <a:avLst/>
+          </a:prstGeom>
+          <a:ln w="38100">
+            <a:solidFill>
+              <a:schemeClr val="tx1"/>
+            </a:solidFill>
+          </a:ln>
+        </p:spPr>
+        <p:style>
+          <a:lnRef idx="1">
+            <a:schemeClr val="accent1"/>
+          </a:lnRef>
+          <a:fillRef idx="0">
+            <a:schemeClr val="accent1"/>
+          </a:fillRef>
+          <a:effectRef idx="0">
+            <a:schemeClr val="accent1"/>
+          </a:effectRef>
+          <a:fontRef idx="minor">
+            <a:schemeClr val="tx1"/>
+          </a:fontRef>
+        </p:style>
+      </p:cxnSp>
+      <p:pic>
+        <p:nvPicPr>
+          <p:cNvPr id="7" name="Picture 6"/>
+          <p:cNvPicPr>
+            <a:picLocks noChangeAspect="1"/>
+          </p:cNvPicPr>
+          <p:nvPr/>
+        </p:nvPicPr>
+        <p:blipFill>
+          <a:blip r:embed="rId8"/>
+          <a:stretch>
+            <a:fillRect/>
+          </a:stretch>
+        </p:blipFill>
+        <p:spPr>
+          <a:xfrm>
+            <a:off x="962361" y="1232998"/>
+            <a:ext cx="279400" cy="254000"/>
+          </a:xfrm>
+          <a:prstGeom prst="rect">
+            <a:avLst/>
+          </a:prstGeom>
+        </p:spPr>
+      </p:pic>
+      <p:cxnSp>
+        <p:nvCxnSpPr>
+          <p:cNvPr id="49" name="Straight Connector 48"/>
+          <p:cNvCxnSpPr/>
+          <p:nvPr/>
+        </p:nvCxnSpPr>
+        <p:spPr>
+          <a:xfrm>
+            <a:off x="1508423" y="988493"/>
+            <a:ext cx="6886239" cy="0"/>
+          </a:xfrm>
+          <a:prstGeom prst="line">
+            <a:avLst/>
+          </a:prstGeom>
+          <a:ln w="28575">
+            <a:solidFill>
+              <a:schemeClr val="tx1"/>
+            </a:solidFill>
+          </a:ln>
+        </p:spPr>
+        <p:style>
+          <a:lnRef idx="1">
+            <a:schemeClr val="accent1"/>
+          </a:lnRef>
+          <a:fillRef idx="0">
+            <a:schemeClr val="accent1"/>
+          </a:fillRef>
+          <a:effectRef idx="0">
+            <a:schemeClr val="accent1"/>
+          </a:effectRef>
+          <a:fontRef idx="minor">
+            <a:schemeClr val="tx1"/>
+          </a:fontRef>
+        </p:style>
+      </p:cxnSp>
+      <p:pic>
+        <p:nvPicPr>
+          <p:cNvPr id="14" name="Picture 13"/>
+          <p:cNvPicPr>
+            <a:picLocks noChangeAspect="1"/>
+          </p:cNvPicPr>
+          <p:nvPr/>
+        </p:nvPicPr>
+        <p:blipFill>
+          <a:blip r:embed="rId9"/>
+          <a:stretch>
+            <a:fillRect/>
+          </a:stretch>
+        </p:blipFill>
+        <p:spPr>
+          <a:xfrm>
+            <a:off x="957349" y="833726"/>
+            <a:ext cx="279400" cy="254000"/>
+          </a:xfrm>
+          <a:prstGeom prst="rect">
+            <a:avLst/>
+          </a:prstGeom>
+        </p:spPr>
+      </p:pic>
+      <p:pic>
+        <p:nvPicPr>
+          <p:cNvPr id="16" name="Picture 15"/>
+          <p:cNvPicPr>
+            <a:picLocks noChangeAspect="1"/>
+          </p:cNvPicPr>
+          <p:nvPr/>
+        </p:nvPicPr>
+        <p:blipFill>
+          <a:blip r:embed="rId10"/>
+          <a:stretch>
+            <a:fillRect/>
+          </a:stretch>
+        </p:blipFill>
+        <p:spPr>
+          <a:xfrm>
+            <a:off x="957789" y="4907128"/>
+            <a:ext cx="279400" cy="304800"/>
+          </a:xfrm>
+          <a:prstGeom prst="rect">
+            <a:avLst/>
+          </a:prstGeom>
+        </p:spPr>
+      </p:pic>
+      <p:pic>
+        <p:nvPicPr>
+          <p:cNvPr id="31" name="Picture 30"/>
+          <p:cNvPicPr>
+            <a:picLocks noChangeAspect="1"/>
+          </p:cNvPicPr>
+          <p:nvPr/>
+        </p:nvPicPr>
+        <p:blipFill>
+          <a:blip r:embed="rId11"/>
+          <a:stretch>
+            <a:fillRect/>
+          </a:stretch>
+        </p:blipFill>
+        <p:spPr>
+          <a:xfrm>
+            <a:off x="956584" y="3874441"/>
+            <a:ext cx="254000" cy="304800"/>
+          </a:xfrm>
+          <a:prstGeom prst="rect">
+            <a:avLst/>
+          </a:prstGeom>
+        </p:spPr>
+      </p:pic>
+      <p:pic>
+        <p:nvPicPr>
+          <p:cNvPr id="36" name="Picture 35"/>
+          <p:cNvPicPr>
+            <a:picLocks noChangeAspect="1"/>
+          </p:cNvPicPr>
+          <p:nvPr/>
+        </p:nvPicPr>
+        <p:blipFill>
+          <a:blip r:embed="rId12"/>
+          <a:stretch>
+            <a:fillRect/>
+          </a:stretch>
+        </p:blipFill>
+        <p:spPr>
+          <a:xfrm>
+            <a:off x="956584" y="4262018"/>
+            <a:ext cx="254000" cy="304800"/>
+          </a:xfrm>
+          <a:prstGeom prst="rect">
+            <a:avLst/>
+          </a:prstGeom>
+        </p:spPr>
+      </p:pic>
+      <p:pic>
+        <p:nvPicPr>
+          <p:cNvPr id="37" name="Picture 36"/>
+          <p:cNvPicPr>
+            <a:picLocks noChangeAspect="1"/>
+          </p:cNvPicPr>
+          <p:nvPr/>
+        </p:nvPicPr>
+        <p:blipFill>
+          <a:blip r:embed="rId13"/>
+          <a:stretch>
+            <a:fillRect/>
+          </a:stretch>
+        </p:blipFill>
+        <p:spPr>
+          <a:xfrm>
+            <a:off x="972876" y="2437450"/>
+            <a:ext cx="203200" cy="203200"/>
+          </a:xfrm>
+          <a:prstGeom prst="rect">
+            <a:avLst/>
+          </a:prstGeom>
+        </p:spPr>
+      </p:pic>
+      <p:pic>
+        <p:nvPicPr>
+          <p:cNvPr id="48" name="Picture 47"/>
+          <p:cNvPicPr>
+            <a:picLocks noChangeAspect="1"/>
+          </p:cNvPicPr>
+          <p:nvPr/>
+        </p:nvPicPr>
+        <p:blipFill>
+          <a:blip r:embed="rId14"/>
+          <a:stretch>
+            <a:fillRect/>
+          </a:stretch>
+        </p:blipFill>
+        <p:spPr>
+          <a:xfrm>
+            <a:off x="956076" y="2029413"/>
+            <a:ext cx="190500" cy="203200"/>
+          </a:xfrm>
+          <a:prstGeom prst="rect">
+            <a:avLst/>
+          </a:prstGeom>
+        </p:spPr>
+      </p:pic>
+      <p:pic>
+        <p:nvPicPr>
+          <p:cNvPr id="51" name="Picture 50"/>
+          <p:cNvPicPr>
+            <a:picLocks noChangeAspect="1"/>
+          </p:cNvPicPr>
+          <p:nvPr/>
+        </p:nvPicPr>
+        <p:blipFill>
+          <a:blip r:embed="rId15"/>
+          <a:stretch>
+            <a:fillRect/>
+          </a:stretch>
+        </p:blipFill>
+        <p:spPr>
+          <a:xfrm>
+            <a:off x="953726" y="1646651"/>
+            <a:ext cx="152400" cy="215900"/>
+          </a:xfrm>
+          <a:prstGeom prst="rect">
+            <a:avLst/>
+          </a:prstGeom>
+        </p:spPr>
+      </p:pic>
+      <p:sp>
+        <p:nvSpPr>
+          <p:cNvPr id="67" name="Rectangle 66"/>
+          <p:cNvSpPr/>
+          <p:nvPr/>
+        </p:nvSpPr>
+        <p:spPr>
+          <a:xfrm>
+            <a:off x="4855456" y="749011"/>
+            <a:ext cx="792195" cy="478963"/>
+          </a:xfrm>
+          <a:prstGeom prst="rect">
+            <a:avLst/>
+          </a:prstGeom>
+          <a:solidFill>
+            <a:schemeClr val="bg1"/>
+          </a:solidFill>
+          <a:ln w="28575">
+            <a:solidFill>
+              <a:schemeClr val="tx1"/>
+            </a:solidFill>
+          </a:ln>
+        </p:spPr>
+        <p:style>
+          <a:lnRef idx="2">
+            <a:schemeClr val="accent1">
+              <a:shade val="50000"/>
+            </a:schemeClr>
+          </a:lnRef>
+          <a:fillRef idx="1">
+            <a:schemeClr val="accent1"/>
+          </a:fillRef>
+          <a:effectRef idx="0">
+            <a:schemeClr val="accent1"/>
+          </a:effectRef>
+          <a:fontRef idx="minor">
+            <a:schemeClr val="lt1"/>
+          </a:fontRef>
+        </p:style>
+        <p:txBody>
+          <a:bodyPr rtlCol="0" anchor="ctr"/>
+          <a:lstStyle/>
+          <a:p>
+            <a:pPr algn="ctr"/>
+            <a:endParaRPr lang="en-US"/>
+          </a:p>
+        </p:txBody>
+      </p:sp>
+      <p:pic>
+        <p:nvPicPr>
+          <p:cNvPr id="52" name="Picture 51"/>
+          <p:cNvPicPr>
+            <a:picLocks noChangeAspect="1"/>
+          </p:cNvPicPr>
+          <p:nvPr/>
+        </p:nvPicPr>
+        <p:blipFill>
+          <a:blip r:embed="rId16"/>
+          <a:stretch>
+            <a:fillRect/>
+          </a:stretch>
+        </p:blipFill>
+        <p:spPr>
+          <a:xfrm>
+            <a:off x="4925994" y="853736"/>
+            <a:ext cx="609600" cy="254000"/>
+          </a:xfrm>
+          <a:prstGeom prst="rect">
+            <a:avLst/>
+          </a:prstGeom>
+        </p:spPr>
+      </p:pic>
+      <p:pic>
+        <p:nvPicPr>
+          <p:cNvPr id="58" name="Picture 57"/>
+          <p:cNvPicPr>
+            <a:picLocks noChangeAspect="1"/>
+          </p:cNvPicPr>
+          <p:nvPr/>
+        </p:nvPicPr>
+        <p:blipFill>
+          <a:blip r:embed="rId17"/>
+          <a:stretch>
+            <a:fillRect/>
+          </a:stretch>
+        </p:blipFill>
+        <p:spPr>
+          <a:xfrm>
+            <a:off x="3131840" y="2630043"/>
+            <a:ext cx="469900" cy="203200"/>
+          </a:xfrm>
+          <a:prstGeom prst="rect">
+            <a:avLst/>
+          </a:prstGeom>
+        </p:spPr>
+      </p:pic>
+      <p:sp>
+        <p:nvSpPr>
+          <p:cNvPr id="76" name="Oval 75"/>
+          <p:cNvSpPr/>
+          <p:nvPr/>
+        </p:nvSpPr>
+        <p:spPr>
+          <a:xfrm>
+            <a:off x="6439868" y="917915"/>
+            <a:ext cx="167913" cy="154723"/>
+          </a:xfrm>
+          <a:prstGeom prst="ellipse">
+            <a:avLst/>
+          </a:prstGeom>
+          <a:solidFill>
+            <a:schemeClr val="tx1"/>
+          </a:solidFill>
+          <a:ln>
+            <a:solidFill>
+              <a:schemeClr val="tx1"/>
+            </a:solidFill>
+          </a:ln>
+        </p:spPr>
+        <p:style>
+          <a:lnRef idx="2">
+            <a:schemeClr val="accent1">
+              <a:shade val="50000"/>
+            </a:schemeClr>
+          </a:lnRef>
+          <a:fillRef idx="1">
+            <a:schemeClr val="accent1"/>
+          </a:fillRef>
+          <a:effectRef idx="0">
+            <a:schemeClr val="accent1"/>
+          </a:effectRef>
+          <a:fontRef idx="minor">
+            <a:schemeClr val="lt1"/>
+          </a:fontRef>
+        </p:style>
+        <p:txBody>
+          <a:bodyPr rtlCol="0" anchor="ctr"/>
+          <a:lstStyle/>
+          <a:p>
+            <a:pPr algn="ctr"/>
+            <a:endParaRPr lang="en-US"/>
+          </a:p>
+        </p:txBody>
+      </p:sp>
+      <p:pic>
+        <p:nvPicPr>
+          <p:cNvPr id="61" name="Picture 60"/>
+          <p:cNvPicPr>
+            <a:picLocks noChangeAspect="1"/>
+          </p:cNvPicPr>
+          <p:nvPr/>
+        </p:nvPicPr>
+        <p:blipFill>
+          <a:blip r:embed="rId18"/>
+          <a:stretch>
+            <a:fillRect/>
+          </a:stretch>
+        </p:blipFill>
+        <p:spPr>
+          <a:xfrm>
+            <a:off x="3236811" y="1216655"/>
+            <a:ext cx="292100" cy="292100"/>
+          </a:xfrm>
+          <a:prstGeom prst="rect">
+            <a:avLst/>
+          </a:prstGeom>
+        </p:spPr>
+      </p:pic>
+      <p:sp>
+        <p:nvSpPr>
+          <p:cNvPr id="77" name="Rectangle 76"/>
+          <p:cNvSpPr/>
+          <p:nvPr/>
+        </p:nvSpPr>
+        <p:spPr>
+          <a:xfrm>
+            <a:off x="6101274" y="2283633"/>
+            <a:ext cx="853370" cy="484125"/>
+          </a:xfrm>
+          <a:prstGeom prst="rect">
+            <a:avLst/>
+          </a:prstGeom>
+          <a:solidFill>
+            <a:schemeClr val="bg1"/>
+          </a:solidFill>
+          <a:ln w="28575">
+            <a:solidFill>
+              <a:schemeClr val="tx1"/>
+            </a:solidFill>
+          </a:ln>
+        </p:spPr>
+        <p:style>
+          <a:lnRef idx="2">
+            <a:schemeClr val="accent1">
+              <a:shade val="50000"/>
+            </a:schemeClr>
+          </a:lnRef>
+          <a:fillRef idx="1">
+            <a:schemeClr val="accent1"/>
+          </a:fillRef>
+          <a:effectRef idx="0">
+            <a:schemeClr val="accent1"/>
+          </a:effectRef>
+          <a:fontRef idx="minor">
+            <a:schemeClr val="lt1"/>
+          </a:fontRef>
+        </p:style>
+        <p:txBody>
+          <a:bodyPr rtlCol="0" anchor="ctr"/>
+          <a:lstStyle/>
+          <a:p>
+            <a:pPr algn="ctr"/>
+            <a:endParaRPr lang="en-US"/>
+          </a:p>
+        </p:txBody>
+      </p:sp>
+      <p:cxnSp>
+        <p:nvCxnSpPr>
+          <p:cNvPr id="78" name="Straight Connector 77"/>
+          <p:cNvCxnSpPr>
+            <a:endCxn id="76" idx="4"/>
+          </p:cNvCxnSpPr>
+          <p:nvPr/>
+        </p:nvCxnSpPr>
+        <p:spPr>
+          <a:xfrm flipH="1" flipV="1">
+            <a:off x="6523825" y="1072638"/>
+            <a:ext cx="2" cy="1224701"/>
+          </a:xfrm>
+          <a:prstGeom prst="line">
+            <a:avLst/>
+          </a:prstGeom>
+          <a:ln w="38100">
+            <a:solidFill>
+              <a:schemeClr val="tx1"/>
+            </a:solidFill>
+          </a:ln>
+        </p:spPr>
+        <p:style>
+          <a:lnRef idx="1">
+            <a:schemeClr val="accent1"/>
+          </a:lnRef>
+          <a:fillRef idx="0">
+            <a:schemeClr val="accent1"/>
+          </a:fillRef>
+          <a:effectRef idx="0">
+            <a:schemeClr val="accent1"/>
+          </a:effectRef>
+          <a:fontRef idx="minor">
+            <a:schemeClr val="tx1"/>
+          </a:fontRef>
+        </p:style>
+      </p:cxnSp>
+      <p:pic>
+        <p:nvPicPr>
+          <p:cNvPr id="62" name="Picture 61"/>
+          <p:cNvPicPr>
+            <a:picLocks noChangeAspect="1"/>
+          </p:cNvPicPr>
+          <p:nvPr/>
+        </p:nvPicPr>
+        <p:blipFill>
+          <a:blip r:embed="rId19"/>
+          <a:stretch>
+            <a:fillRect/>
+          </a:stretch>
+        </p:blipFill>
+        <p:spPr>
+          <a:xfrm>
+            <a:off x="6217841" y="2417108"/>
+            <a:ext cx="622300" cy="203200"/>
+          </a:xfrm>
+          <a:prstGeom prst="rect">
+            <a:avLst/>
+          </a:prstGeom>
+        </p:spPr>
+      </p:pic>
+    </p:spTree>
+    <p:extLst>
+      <p:ext uri="{BB962C8B-B14F-4D97-AF65-F5344CB8AC3E}">
+        <p14:creationId xmlns:p14="http://schemas.microsoft.com/office/powerpoint/2010/main" val="270247716"/>
+      </p:ext>
+    </p:extLst>
+  </p:cSld>
+  <p:clrMapOvr>
+    <a:masterClrMapping/>
+  </p:clrMapOvr>
+</p:sld>
+</file>
+
+<file path=ppt/slides/slide6.xml><?xml version="1.0" encoding="utf-8"?>
+<p:sld xmlns:a="http://schemas.openxmlformats.org/drawingml/2006/main" xmlns:r="http://schemas.openxmlformats.org/officeDocument/2006/relationships" xmlns:p="http://schemas.openxmlformats.org/presentationml/2006/main">
+  <p:cSld>
+    <p:spTree>
+      <p:nvGrpSpPr>
+        <p:cNvPr id="1" name=""/>
+        <p:cNvGrpSpPr/>
+        <p:nvPr/>
+      </p:nvGrpSpPr>
+      <p:grpSpPr>
+        <a:xfrm>
+          <a:off x="0" y="0"/>
+          <a:ext cx="0" cy="0"/>
+          <a:chOff x="0" y="0"/>
+          <a:chExt cx="0" cy="0"/>
+        </a:xfrm>
+      </p:grpSpPr>
+      <p:cxnSp>
+        <p:nvCxnSpPr>
+          <p:cNvPr id="38" name="Straight Connector 37"/>
+          <p:cNvCxnSpPr/>
+          <p:nvPr/>
+        </p:nvCxnSpPr>
+        <p:spPr>
+          <a:xfrm>
+            <a:off x="1568805" y="4473897"/>
+            <a:ext cx="6810640" cy="0"/>
+          </a:xfrm>
+          <a:prstGeom prst="line">
+            <a:avLst/>
+          </a:prstGeom>
+          <a:ln w="28575">
+            <a:solidFill>
+              <a:schemeClr val="tx1"/>
+            </a:solidFill>
+          </a:ln>
+        </p:spPr>
+        <p:style>
+          <a:lnRef idx="1">
+            <a:schemeClr val="accent1"/>
+          </a:lnRef>
+          <a:fillRef idx="0">
+            <a:schemeClr val="accent1"/>
+          </a:fillRef>
+          <a:effectRef idx="0">
+            <a:schemeClr val="accent1"/>
+          </a:effectRef>
+          <a:fontRef idx="minor">
+            <a:schemeClr val="tx1"/>
+          </a:fontRef>
+        </p:style>
+      </p:cxnSp>
+      <p:cxnSp>
+        <p:nvCxnSpPr>
+          <p:cNvPr id="84" name="Straight Connector 83"/>
+          <p:cNvCxnSpPr/>
+          <p:nvPr/>
+        </p:nvCxnSpPr>
+        <p:spPr>
+          <a:xfrm>
+            <a:off x="1566878" y="5107955"/>
+            <a:ext cx="6810640" cy="0"/>
+          </a:xfrm>
+          <a:prstGeom prst="line">
+            <a:avLst/>
+          </a:prstGeom>
+          <a:ln w="28575">
+            <a:solidFill>
+              <a:schemeClr val="tx1"/>
+            </a:solidFill>
+          </a:ln>
+        </p:spPr>
+        <p:style>
+          <a:lnRef idx="1">
+            <a:schemeClr val="accent1"/>
+          </a:lnRef>
+          <a:fillRef idx="0">
+            <a:schemeClr val="accent1"/>
+          </a:fillRef>
+          <a:effectRef idx="0">
+            <a:schemeClr val="accent1"/>
+          </a:effectRef>
+          <a:fontRef idx="minor">
+            <a:schemeClr val="tx1"/>
+          </a:fontRef>
+        </p:style>
+      </p:cxnSp>
+      <p:cxnSp>
+        <p:nvCxnSpPr>
+          <p:cNvPr id="34" name="Straight Connector 33"/>
+          <p:cNvCxnSpPr/>
+          <p:nvPr/>
+        </p:nvCxnSpPr>
+        <p:spPr>
+          <a:xfrm flipV="1">
+            <a:off x="1653905" y="3676204"/>
+            <a:ext cx="6723613" cy="19891"/>
+          </a:xfrm>
+          <a:prstGeom prst="line">
+            <a:avLst/>
+          </a:prstGeom>
+          <a:ln w="28575">
+            <a:solidFill>
+              <a:schemeClr val="tx1"/>
+            </a:solidFill>
+          </a:ln>
+        </p:spPr>
+        <p:style>
+          <a:lnRef idx="1">
+            <a:schemeClr val="accent1"/>
+          </a:lnRef>
+          <a:fillRef idx="0">
+            <a:schemeClr val="accent1"/>
+          </a:fillRef>
+          <a:effectRef idx="0">
+            <a:schemeClr val="accent1"/>
+          </a:effectRef>
+          <a:fontRef idx="minor">
+            <a:schemeClr val="tx1"/>
+          </a:fontRef>
+        </p:style>
+      </p:cxnSp>
+      <p:cxnSp>
+        <p:nvCxnSpPr>
+          <p:cNvPr id="23" name="Straight Connector 22"/>
+          <p:cNvCxnSpPr/>
+          <p:nvPr/>
+        </p:nvCxnSpPr>
+        <p:spPr>
+          <a:xfrm flipV="1">
+            <a:off x="1525569" y="2525688"/>
+            <a:ext cx="6851949" cy="192"/>
+          </a:xfrm>
+          <a:prstGeom prst="line">
+            <a:avLst/>
+          </a:prstGeom>
+          <a:ln w="28575">
+            <a:solidFill>
+              <a:schemeClr val="tx1"/>
+            </a:solidFill>
+          </a:ln>
+        </p:spPr>
+        <p:style>
+          <a:lnRef idx="1">
+            <a:schemeClr val="accent1"/>
+          </a:lnRef>
+          <a:fillRef idx="0">
+            <a:schemeClr val="accent1"/>
+          </a:fillRef>
+          <a:effectRef idx="0">
+            <a:schemeClr val="accent1"/>
+          </a:effectRef>
+          <a:fontRef idx="minor">
+            <a:schemeClr val="tx1"/>
+          </a:fontRef>
+        </p:style>
+      </p:cxnSp>
+      <p:cxnSp>
+        <p:nvCxnSpPr>
+          <p:cNvPr id="24" name="Straight Connector 23"/>
+          <p:cNvCxnSpPr/>
+          <p:nvPr/>
+        </p:nvCxnSpPr>
+        <p:spPr>
+          <a:xfrm flipV="1">
+            <a:off x="1653905" y="2833110"/>
+            <a:ext cx="6723613" cy="10820"/>
+          </a:xfrm>
+          <a:prstGeom prst="line">
+            <a:avLst/>
+          </a:prstGeom>
+          <a:ln w="28575">
+            <a:solidFill>
+              <a:schemeClr val="tx1"/>
+            </a:solidFill>
+          </a:ln>
+        </p:spPr>
+        <p:style>
+          <a:lnRef idx="1">
+            <a:schemeClr val="accent1"/>
+          </a:lnRef>
+          <a:fillRef idx="0">
+            <a:schemeClr val="accent1"/>
+          </a:fillRef>
+          <a:effectRef idx="0">
+            <a:schemeClr val="accent1"/>
+          </a:effectRef>
+          <a:fontRef idx="minor">
+            <a:schemeClr val="tx1"/>
+          </a:fontRef>
+        </p:style>
+      </p:cxnSp>
+      <p:cxnSp>
+        <p:nvCxnSpPr>
+          <p:cNvPr id="44" name="Straight Connector 43"/>
+          <p:cNvCxnSpPr/>
+          <p:nvPr/>
+        </p:nvCxnSpPr>
+        <p:spPr>
+          <a:xfrm>
+            <a:off x="1629641" y="4015485"/>
+            <a:ext cx="6747877" cy="0"/>
+          </a:xfrm>
+          <a:prstGeom prst="line">
+            <a:avLst/>
+          </a:prstGeom>
+          <a:ln w="28575">
+            <a:solidFill>
+              <a:schemeClr val="tx1"/>
+            </a:solidFill>
+          </a:ln>
+        </p:spPr>
+        <p:style>
+          <a:lnRef idx="1">
+            <a:schemeClr val="accent1"/>
+          </a:lnRef>
+          <a:fillRef idx="0">
+            <a:schemeClr val="accent1"/>
+          </a:fillRef>
+          <a:effectRef idx="0">
+            <a:schemeClr val="accent1"/>
+          </a:effectRef>
+          <a:fontRef idx="minor">
+            <a:schemeClr val="tx1"/>
+          </a:fontRef>
+        </p:style>
+      </p:cxnSp>
+      <p:cxnSp>
+        <p:nvCxnSpPr>
+          <p:cNvPr id="17" name="Straight Connector 16"/>
+          <p:cNvCxnSpPr/>
+          <p:nvPr/>
+        </p:nvCxnSpPr>
+        <p:spPr>
+          <a:xfrm>
+            <a:off x="1491279" y="943311"/>
+            <a:ext cx="6886239" cy="30480"/>
+          </a:xfrm>
+          <a:prstGeom prst="line">
+            <a:avLst/>
+          </a:prstGeom>
+          <a:ln w="28575">
+            <a:solidFill>
+              <a:schemeClr val="tx1"/>
+            </a:solidFill>
+          </a:ln>
+        </p:spPr>
+        <p:style>
+          <a:lnRef idx="1">
+            <a:schemeClr val="accent1"/>
+          </a:lnRef>
+          <a:fillRef idx="0">
+            <a:schemeClr val="accent1"/>
+          </a:fillRef>
+          <a:effectRef idx="0">
+            <a:schemeClr val="accent1"/>
+          </a:effectRef>
+          <a:fontRef idx="minor">
+            <a:schemeClr val="tx1"/>
+          </a:fontRef>
+        </p:style>
+      </p:cxnSp>
+      <p:cxnSp>
+        <p:nvCxnSpPr>
+          <p:cNvPr id="18" name="Straight Connector 17"/>
+          <p:cNvCxnSpPr/>
+          <p:nvPr/>
+        </p:nvCxnSpPr>
+        <p:spPr>
+          <a:xfrm>
+            <a:off x="1491279" y="1297641"/>
+            <a:ext cx="6886239" cy="28878"/>
+          </a:xfrm>
+          <a:prstGeom prst="line">
+            <a:avLst/>
+          </a:prstGeom>
+          <a:ln w="28575">
+            <a:solidFill>
+              <a:schemeClr val="tx1"/>
+            </a:solidFill>
+          </a:ln>
+        </p:spPr>
+        <p:style>
+          <a:lnRef idx="1">
+            <a:schemeClr val="accent1"/>
+          </a:lnRef>
+          <a:fillRef idx="0">
+            <a:schemeClr val="accent1"/>
+          </a:fillRef>
+          <a:effectRef idx="0">
+            <a:schemeClr val="accent1"/>
+          </a:effectRef>
+          <a:fontRef idx="minor">
+            <a:schemeClr val="tx1"/>
+          </a:fontRef>
+        </p:style>
+      </p:cxnSp>
+      <p:cxnSp>
+        <p:nvCxnSpPr>
+          <p:cNvPr id="19" name="Straight Connector 18"/>
+          <p:cNvCxnSpPr/>
+          <p:nvPr/>
+        </p:nvCxnSpPr>
+        <p:spPr>
+          <a:xfrm>
+            <a:off x="1491279" y="1636731"/>
+            <a:ext cx="6886239" cy="25241"/>
+          </a:xfrm>
+          <a:prstGeom prst="line">
+            <a:avLst/>
+          </a:prstGeom>
+          <a:ln w="28575">
+            <a:solidFill>
+              <a:schemeClr val="tx1"/>
+            </a:solidFill>
+          </a:ln>
+        </p:spPr>
+        <p:style>
+          <a:lnRef idx="1">
+            <a:schemeClr val="accent1"/>
+          </a:lnRef>
+          <a:fillRef idx="0">
+            <a:schemeClr val="accent1"/>
+          </a:fillRef>
+          <a:effectRef idx="0">
+            <a:schemeClr val="accent1"/>
+          </a:effectRef>
+          <a:fontRef idx="minor">
+            <a:schemeClr val="tx1"/>
+          </a:fontRef>
+        </p:style>
+      </p:cxnSp>
+      <p:cxnSp>
+        <p:nvCxnSpPr>
+          <p:cNvPr id="20" name="Straight Connector 19"/>
+          <p:cNvCxnSpPr/>
+          <p:nvPr/>
+        </p:nvCxnSpPr>
+        <p:spPr>
+          <a:xfrm>
+            <a:off x="1525569" y="2120601"/>
+            <a:ext cx="6851949" cy="0"/>
+          </a:xfrm>
+          <a:prstGeom prst="line">
+            <a:avLst/>
+          </a:prstGeom>
+          <a:ln w="28575">
+            <a:solidFill>
+              <a:schemeClr val="tx1"/>
+            </a:solidFill>
+          </a:ln>
+        </p:spPr>
+        <p:style>
+          <a:lnRef idx="1">
+            <a:schemeClr val="accent1"/>
+          </a:lnRef>
+          <a:fillRef idx="0">
+            <a:schemeClr val="accent1"/>
+          </a:fillRef>
+          <a:effectRef idx="0">
+            <a:schemeClr val="accent1"/>
+          </a:effectRef>
+          <a:fontRef idx="minor">
+            <a:schemeClr val="tx1"/>
+          </a:fontRef>
+        </p:style>
+      </p:cxnSp>
+      <p:cxnSp>
+        <p:nvCxnSpPr>
+          <p:cNvPr id="22" name="Straight Connector 21"/>
+          <p:cNvCxnSpPr/>
+          <p:nvPr/>
+        </p:nvCxnSpPr>
+        <p:spPr>
+          <a:xfrm>
+            <a:off x="1566878" y="4807637"/>
+            <a:ext cx="6810640" cy="0"/>
+          </a:xfrm>
+          <a:prstGeom prst="line">
+            <a:avLst/>
+          </a:prstGeom>
+          <a:ln w="28575">
+            <a:solidFill>
+              <a:schemeClr val="tx1"/>
+            </a:solidFill>
+          </a:ln>
+        </p:spPr>
+        <p:style>
+          <a:lnRef idx="1">
+            <a:schemeClr val="accent1"/>
+          </a:lnRef>
+          <a:fillRef idx="0">
+            <a:schemeClr val="accent1"/>
+          </a:fillRef>
+          <a:effectRef idx="0">
+            <a:schemeClr val="accent1"/>
+          </a:effectRef>
+          <a:fontRef idx="minor">
+            <a:schemeClr val="tx1"/>
+          </a:fontRef>
+        </p:style>
+      </p:cxnSp>
+      <p:sp>
+        <p:nvSpPr>
+          <p:cNvPr id="9" name="Rectangle 8"/>
+          <p:cNvSpPr/>
+          <p:nvPr/>
+        </p:nvSpPr>
+        <p:spPr>
+          <a:xfrm>
+            <a:off x="4591378" y="4211996"/>
+            <a:ext cx="970068" cy="749514"/>
+          </a:xfrm>
+          <a:prstGeom prst="rect">
+            <a:avLst/>
+          </a:prstGeom>
+          <a:solidFill>
+            <a:schemeClr val="bg1"/>
+          </a:solidFill>
+          <a:ln w="28575">
+            <a:solidFill>
+              <a:schemeClr val="tx1"/>
+            </a:solidFill>
+          </a:ln>
+        </p:spPr>
+        <p:style>
+          <a:lnRef idx="2">
+            <a:schemeClr val="accent1">
+              <a:shade val="50000"/>
+            </a:schemeClr>
+          </a:lnRef>
+          <a:fillRef idx="1">
+            <a:schemeClr val="accent1"/>
+          </a:fillRef>
+          <a:effectRef idx="0">
+            <a:schemeClr val="accent1"/>
+          </a:effectRef>
+          <a:fontRef idx="minor">
+            <a:schemeClr val="lt1"/>
+          </a:fontRef>
+        </p:style>
+        <p:txBody>
+          <a:bodyPr rtlCol="0" anchor="ctr"/>
+          <a:lstStyle/>
+          <a:p>
+            <a:pPr algn="ctr"/>
+            <a:endParaRPr lang="en-US"/>
+          </a:p>
+        </p:txBody>
+      </p:sp>
+      <p:sp>
+        <p:nvSpPr>
+          <p:cNvPr id="11" name="Rectangle 10"/>
+          <p:cNvSpPr/>
+          <p:nvPr/>
+        </p:nvSpPr>
+        <p:spPr>
+          <a:xfrm>
+            <a:off x="7049840" y="774535"/>
+            <a:ext cx="1120140" cy="1572261"/>
+          </a:xfrm>
+          <a:prstGeom prst="rect">
+            <a:avLst/>
+          </a:prstGeom>
+          <a:solidFill>
+            <a:schemeClr val="bg1"/>
+          </a:solidFill>
+          <a:ln w="28575">
+            <a:solidFill>
+              <a:schemeClr val="tx1"/>
+            </a:solidFill>
+          </a:ln>
+        </p:spPr>
+        <p:style>
+          <a:lnRef idx="2">
+            <a:schemeClr val="accent1">
+              <a:shade val="50000"/>
+            </a:schemeClr>
+          </a:lnRef>
+          <a:fillRef idx="1">
+            <a:schemeClr val="accent1"/>
+          </a:fillRef>
+          <a:effectRef idx="0">
+            <a:schemeClr val="accent1"/>
+          </a:effectRef>
+          <a:fontRef idx="minor">
+            <a:schemeClr val="lt1"/>
+          </a:fontRef>
+        </p:style>
+        <p:txBody>
+          <a:bodyPr rtlCol="0" anchor="ctr"/>
+          <a:lstStyle/>
+          <a:p>
+            <a:pPr algn="ctr"/>
+            <a:endParaRPr lang="en-US"/>
+          </a:p>
+        </p:txBody>
+      </p:sp>
+      <p:pic>
+        <p:nvPicPr>
+          <p:cNvPr id="12" name="Picture 11"/>
+          <p:cNvPicPr>
+            <a:picLocks noChangeAspect="1"/>
+          </p:cNvPicPr>
+          <p:nvPr/>
+        </p:nvPicPr>
+        <p:blipFill>
+          <a:blip r:embed="rId2"/>
+          <a:stretch>
+            <a:fillRect/>
+          </a:stretch>
+        </p:blipFill>
+        <p:spPr>
+          <a:xfrm>
+            <a:off x="7324160" y="1366203"/>
+            <a:ext cx="571500" cy="406400"/>
+          </a:xfrm>
+          <a:prstGeom prst="rect">
+            <a:avLst/>
+          </a:prstGeom>
+        </p:spPr>
+      </p:pic>
+      <p:pic>
+        <p:nvPicPr>
+          <p:cNvPr id="13" name="Picture 12"/>
+          <p:cNvPicPr>
+            <a:picLocks noChangeAspect="1"/>
+          </p:cNvPicPr>
+          <p:nvPr/>
+        </p:nvPicPr>
+        <p:blipFill>
+          <a:blip r:embed="rId3"/>
+          <a:stretch>
+            <a:fillRect/>
+          </a:stretch>
+        </p:blipFill>
+        <p:spPr>
+          <a:xfrm>
+            <a:off x="4899025" y="4442614"/>
+            <a:ext cx="342900" cy="317500"/>
+          </a:xfrm>
+          <a:prstGeom prst="rect">
+            <a:avLst/>
+          </a:prstGeom>
+        </p:spPr>
+      </p:pic>
+      <p:cxnSp>
+        <p:nvCxnSpPr>
+          <p:cNvPr id="25" name="Straight Connector 24"/>
+          <p:cNvCxnSpPr/>
+          <p:nvPr/>
+        </p:nvCxnSpPr>
+        <p:spPr>
+          <a:xfrm flipV="1">
+            <a:off x="1389919" y="2525881"/>
+            <a:ext cx="143718" cy="318048"/>
+          </a:xfrm>
+          <a:prstGeom prst="line">
+            <a:avLst/>
+          </a:prstGeom>
+          <a:ln w="28575">
+            <a:solidFill>
+              <a:schemeClr val="tx1"/>
+            </a:solidFill>
+          </a:ln>
+        </p:spPr>
+        <p:style>
+          <a:lnRef idx="1">
+            <a:schemeClr val="accent1"/>
+          </a:lnRef>
+          <a:fillRef idx="0">
+            <a:schemeClr val="accent1"/>
+          </a:fillRef>
+          <a:effectRef idx="0">
+            <a:schemeClr val="accent1"/>
+          </a:effectRef>
+          <a:fontRef idx="minor">
+            <a:schemeClr val="tx1"/>
+          </a:fontRef>
+        </p:style>
+      </p:cxnSp>
+      <p:cxnSp>
+        <p:nvCxnSpPr>
+          <p:cNvPr id="26" name="Straight Connector 25"/>
+          <p:cNvCxnSpPr/>
+          <p:nvPr/>
+        </p:nvCxnSpPr>
+        <p:spPr>
+          <a:xfrm flipV="1">
+            <a:off x="1484834" y="2843931"/>
+            <a:ext cx="180500" cy="758982"/>
+          </a:xfrm>
+          <a:prstGeom prst="line">
+            <a:avLst/>
+          </a:prstGeom>
+          <a:ln w="28575">
+            <a:solidFill>
+              <a:schemeClr val="tx1"/>
+            </a:solidFill>
+          </a:ln>
+        </p:spPr>
+        <p:style>
+          <a:lnRef idx="1">
+            <a:schemeClr val="accent1"/>
+          </a:lnRef>
+          <a:fillRef idx="0">
+            <a:schemeClr val="accent1"/>
+          </a:fillRef>
+          <a:effectRef idx="0">
+            <a:schemeClr val="accent1"/>
+          </a:effectRef>
+          <a:fontRef idx="minor">
+            <a:schemeClr val="tx1"/>
+          </a:fontRef>
+        </p:style>
+      </p:cxnSp>
+      <p:cxnSp>
+        <p:nvCxnSpPr>
+          <p:cNvPr id="30" name="Straight Connector 29"/>
+          <p:cNvCxnSpPr/>
+          <p:nvPr/>
+        </p:nvCxnSpPr>
+        <p:spPr>
+          <a:xfrm flipH="1" flipV="1">
+            <a:off x="1383606" y="2837483"/>
+            <a:ext cx="290347" cy="872136"/>
+          </a:xfrm>
+          <a:prstGeom prst="line">
+            <a:avLst/>
+          </a:prstGeom>
+          <a:ln w="28575">
+            <a:solidFill>
+              <a:schemeClr val="tx1"/>
+            </a:solidFill>
+          </a:ln>
+        </p:spPr>
+        <p:style>
+          <a:lnRef idx="1">
+            <a:schemeClr val="accent1"/>
+          </a:lnRef>
+          <a:fillRef idx="0">
+            <a:schemeClr val="accent1"/>
+          </a:fillRef>
+          <a:effectRef idx="0">
+            <a:schemeClr val="accent1"/>
+          </a:effectRef>
+          <a:fontRef idx="minor">
+            <a:schemeClr val="tx1"/>
+          </a:fontRef>
+        </p:style>
+      </p:cxnSp>
+      <p:cxnSp>
+        <p:nvCxnSpPr>
+          <p:cNvPr id="39" name="Straight Connector 38"/>
+          <p:cNvCxnSpPr/>
+          <p:nvPr/>
+        </p:nvCxnSpPr>
+        <p:spPr>
+          <a:xfrm flipH="1" flipV="1">
+            <a:off x="1476215" y="3563810"/>
+            <a:ext cx="153426" cy="451675"/>
+          </a:xfrm>
+          <a:prstGeom prst="line">
+            <a:avLst/>
+          </a:prstGeom>
+          <a:ln w="28575">
+            <a:solidFill>
+              <a:schemeClr val="tx1"/>
+            </a:solidFill>
+          </a:ln>
+        </p:spPr>
+        <p:style>
+          <a:lnRef idx="1">
+            <a:schemeClr val="accent1"/>
+          </a:lnRef>
+          <a:fillRef idx="0">
+            <a:schemeClr val="accent1"/>
+          </a:fillRef>
+          <a:effectRef idx="0">
+            <a:schemeClr val="accent1"/>
+          </a:effectRef>
+          <a:fontRef idx="minor">
+            <a:schemeClr val="tx1"/>
+          </a:fontRef>
+        </p:style>
+      </p:cxnSp>
+      <p:pic>
+        <p:nvPicPr>
+          <p:cNvPr id="103" name="Picture 102"/>
+          <p:cNvPicPr>
+            <a:picLocks noChangeAspect="1"/>
+          </p:cNvPicPr>
+          <p:nvPr/>
+        </p:nvPicPr>
+        <p:blipFill>
+          <a:blip r:embed="rId4"/>
+          <a:stretch>
+            <a:fillRect/>
+          </a:stretch>
+        </p:blipFill>
+        <p:spPr>
+          <a:xfrm>
+            <a:off x="979226" y="853141"/>
+            <a:ext cx="177800" cy="241300"/>
+          </a:xfrm>
+          <a:prstGeom prst="rect">
+            <a:avLst/>
+          </a:prstGeom>
+        </p:spPr>
+      </p:pic>
+      <p:pic>
+        <p:nvPicPr>
+          <p:cNvPr id="104" name="Picture 103"/>
+          <p:cNvPicPr>
+            <a:picLocks noChangeAspect="1"/>
+          </p:cNvPicPr>
+          <p:nvPr/>
+        </p:nvPicPr>
+        <p:blipFill>
+          <a:blip r:embed="rId5"/>
+          <a:stretch>
+            <a:fillRect/>
+          </a:stretch>
+        </p:blipFill>
+        <p:spPr>
+          <a:xfrm>
+            <a:off x="956562" y="2006301"/>
+            <a:ext cx="215900" cy="228600"/>
+          </a:xfrm>
+          <a:prstGeom prst="rect">
+            <a:avLst/>
+          </a:prstGeom>
+        </p:spPr>
+      </p:pic>
+      <p:pic>
+        <p:nvPicPr>
+          <p:cNvPr id="105" name="Picture 104"/>
+          <p:cNvPicPr>
+            <a:picLocks noChangeAspect="1"/>
+          </p:cNvPicPr>
+          <p:nvPr/>
+        </p:nvPicPr>
+        <p:blipFill>
+          <a:blip r:embed="rId6"/>
+          <a:stretch>
+            <a:fillRect/>
+          </a:stretch>
+        </p:blipFill>
+        <p:spPr>
+          <a:xfrm>
+            <a:off x="1066094" y="4649062"/>
+            <a:ext cx="165100" cy="228600"/>
+          </a:xfrm>
+          <a:prstGeom prst="rect">
+            <a:avLst/>
+          </a:prstGeom>
+        </p:spPr>
+      </p:pic>
+      <p:pic>
+        <p:nvPicPr>
+          <p:cNvPr id="106" name="Picture 105"/>
+          <p:cNvPicPr>
+            <a:picLocks noChangeAspect="1"/>
+          </p:cNvPicPr>
+          <p:nvPr/>
+        </p:nvPicPr>
+        <p:blipFill>
+          <a:blip r:embed="rId7"/>
+          <a:stretch>
+            <a:fillRect/>
+          </a:stretch>
+        </p:blipFill>
+        <p:spPr>
+          <a:xfrm>
+            <a:off x="960176" y="1394162"/>
+            <a:ext cx="215900" cy="228600"/>
+          </a:xfrm>
+          <a:prstGeom prst="rect">
+            <a:avLst/>
+          </a:prstGeom>
+        </p:spPr>
+      </p:pic>
+      <p:sp>
+        <p:nvSpPr>
+          <p:cNvPr id="32" name="Rectangle 31"/>
+          <p:cNvSpPr/>
+          <p:nvPr/>
+        </p:nvSpPr>
+        <p:spPr>
+          <a:xfrm>
+            <a:off x="1770044" y="774535"/>
+            <a:ext cx="1120140" cy="1572260"/>
+          </a:xfrm>
+          <a:prstGeom prst="rect">
+            <a:avLst/>
+          </a:prstGeom>
+          <a:solidFill>
+            <a:schemeClr val="bg1"/>
+          </a:solidFill>
+          <a:ln w="28575">
+            <a:solidFill>
+              <a:schemeClr val="tx1"/>
+            </a:solidFill>
+          </a:ln>
+        </p:spPr>
+        <p:style>
+          <a:lnRef idx="2">
+            <a:schemeClr val="accent1">
+              <a:shade val="50000"/>
+            </a:schemeClr>
+          </a:lnRef>
+          <a:fillRef idx="1">
+            <a:schemeClr val="accent1"/>
+          </a:fillRef>
+          <a:effectRef idx="0">
+            <a:schemeClr val="accent1"/>
+          </a:effectRef>
+          <a:fontRef idx="minor">
+            <a:schemeClr val="lt1"/>
+          </a:fontRef>
+        </p:style>
+        <p:txBody>
+          <a:bodyPr rtlCol="0" anchor="ctr"/>
+          <a:lstStyle/>
+          <a:p>
+            <a:pPr algn="ctr"/>
+            <a:endParaRPr lang="en-US"/>
+          </a:p>
+        </p:txBody>
+      </p:sp>
+      <p:pic>
+        <p:nvPicPr>
+          <p:cNvPr id="33" name="Picture 32"/>
+          <p:cNvPicPr>
+            <a:picLocks noChangeAspect="1"/>
+          </p:cNvPicPr>
+          <p:nvPr/>
+        </p:nvPicPr>
+        <p:blipFill>
+          <a:blip r:embed="rId8"/>
+          <a:stretch>
+            <a:fillRect/>
+          </a:stretch>
+        </p:blipFill>
+        <p:spPr>
+          <a:xfrm>
+            <a:off x="2089449" y="1326519"/>
+            <a:ext cx="584200" cy="457200"/>
+          </a:xfrm>
+          <a:prstGeom prst="rect">
+            <a:avLst/>
+          </a:prstGeom>
+        </p:spPr>
+      </p:pic>
+      <p:sp>
+        <p:nvSpPr>
+          <p:cNvPr id="35" name="Rectangle 34"/>
+          <p:cNvSpPr/>
+          <p:nvPr/>
+        </p:nvSpPr>
+        <p:spPr>
+          <a:xfrm>
+            <a:off x="3059022" y="1901054"/>
+            <a:ext cx="732870" cy="817463"/>
+          </a:xfrm>
+          <a:prstGeom prst="rect">
+            <a:avLst/>
+          </a:prstGeom>
+          <a:solidFill>
+            <a:schemeClr val="bg1"/>
+          </a:solidFill>
+          <a:ln w="28575">
+            <a:solidFill>
+              <a:schemeClr val="tx1"/>
+            </a:solidFill>
+          </a:ln>
+        </p:spPr>
+        <p:style>
+          <a:lnRef idx="2">
+            <a:schemeClr val="accent1">
+              <a:shade val="50000"/>
+            </a:schemeClr>
+          </a:lnRef>
+          <a:fillRef idx="1">
+            <a:schemeClr val="accent1"/>
+          </a:fillRef>
+          <a:effectRef idx="0">
+            <a:schemeClr val="accent1"/>
+          </a:effectRef>
+          <a:fontRef idx="minor">
+            <a:schemeClr val="lt1"/>
+          </a:fontRef>
+        </p:style>
+        <p:txBody>
+          <a:bodyPr rtlCol="0" anchor="ctr"/>
+          <a:lstStyle/>
+          <a:p>
+            <a:pPr algn="ctr"/>
+            <a:endParaRPr lang="en-US"/>
+          </a:p>
+        </p:txBody>
+      </p:sp>
+      <p:pic>
+        <p:nvPicPr>
+          <p:cNvPr id="2" name="Picture 1"/>
+          <p:cNvPicPr>
+            <a:picLocks noChangeAspect="1"/>
+          </p:cNvPicPr>
+          <p:nvPr/>
+        </p:nvPicPr>
+        <p:blipFill>
+          <a:blip r:embed="rId9"/>
+          <a:stretch>
+            <a:fillRect/>
+          </a:stretch>
+        </p:blipFill>
+        <p:spPr>
+          <a:xfrm>
+            <a:off x="3191486" y="2168908"/>
+            <a:ext cx="457200" cy="215900"/>
+          </a:xfrm>
+          <a:prstGeom prst="rect">
+            <a:avLst/>
+          </a:prstGeom>
+        </p:spPr>
+      </p:pic>
+      <p:cxnSp>
+        <p:nvCxnSpPr>
+          <p:cNvPr id="6" name="Straight Connector 5"/>
+          <p:cNvCxnSpPr/>
+          <p:nvPr/>
+        </p:nvCxnSpPr>
+        <p:spPr>
+          <a:xfrm flipH="1">
+            <a:off x="6670747" y="2120601"/>
+            <a:ext cx="7185" cy="723328"/>
+          </a:xfrm>
+          <a:prstGeom prst="line">
+            <a:avLst/>
+          </a:prstGeom>
+          <a:ln w="38100">
+            <a:solidFill>
+              <a:schemeClr val="tx1"/>
+            </a:solidFill>
+          </a:ln>
+        </p:spPr>
+        <p:style>
+          <a:lnRef idx="1">
+            <a:schemeClr val="accent1"/>
+          </a:lnRef>
+          <a:fillRef idx="0">
+            <a:schemeClr val="accent1"/>
+          </a:fillRef>
+          <a:effectRef idx="0">
+            <a:schemeClr val="accent1"/>
+          </a:effectRef>
+          <a:fontRef idx="minor">
+            <a:schemeClr val="tx1"/>
+          </a:fontRef>
+        </p:style>
+      </p:cxnSp>
+      <p:cxnSp>
+        <p:nvCxnSpPr>
+          <p:cNvPr id="42" name="Straight Connector 41"/>
+          <p:cNvCxnSpPr/>
+          <p:nvPr/>
+        </p:nvCxnSpPr>
+        <p:spPr>
+          <a:xfrm flipH="1">
+            <a:off x="6589802" y="2014296"/>
+            <a:ext cx="169709" cy="229185"/>
+          </a:xfrm>
+          <a:prstGeom prst="line">
+            <a:avLst/>
+          </a:prstGeom>
+          <a:ln w="38100">
+            <a:solidFill>
+              <a:schemeClr val="tx1"/>
+            </a:solidFill>
+          </a:ln>
+        </p:spPr>
+        <p:style>
+          <a:lnRef idx="1">
+            <a:schemeClr val="accent1"/>
+          </a:lnRef>
+          <a:fillRef idx="0">
+            <a:schemeClr val="accent1"/>
+          </a:fillRef>
+          <a:effectRef idx="0">
+            <a:schemeClr val="accent1"/>
+          </a:effectRef>
+          <a:fontRef idx="minor">
+            <a:schemeClr val="tx1"/>
+          </a:fontRef>
+        </p:style>
+      </p:cxnSp>
+      <p:cxnSp>
+        <p:nvCxnSpPr>
+          <p:cNvPr id="72" name="Straight Connector 71"/>
+          <p:cNvCxnSpPr/>
+          <p:nvPr/>
+        </p:nvCxnSpPr>
+        <p:spPr>
+          <a:xfrm flipH="1">
+            <a:off x="6593077" y="2729337"/>
+            <a:ext cx="169709" cy="229185"/>
+          </a:xfrm>
+          <a:prstGeom prst="line">
+            <a:avLst/>
+          </a:prstGeom>
+          <a:ln w="38100">
+            <a:solidFill>
+              <a:schemeClr val="tx1"/>
+            </a:solidFill>
+          </a:ln>
+        </p:spPr>
+        <p:style>
+          <a:lnRef idx="1">
+            <a:schemeClr val="accent1"/>
+          </a:lnRef>
+          <a:fillRef idx="0">
+            <a:schemeClr val="accent1"/>
+          </a:fillRef>
+          <a:effectRef idx="0">
+            <a:schemeClr val="accent1"/>
+          </a:effectRef>
+          <a:fontRef idx="minor">
+            <a:schemeClr val="tx1"/>
+          </a:fontRef>
+        </p:style>
+      </p:cxnSp>
+      <p:cxnSp>
+        <p:nvCxnSpPr>
+          <p:cNvPr id="73" name="Straight Connector 72"/>
+          <p:cNvCxnSpPr/>
+          <p:nvPr/>
+        </p:nvCxnSpPr>
+        <p:spPr>
+          <a:xfrm flipH="1" flipV="1">
+            <a:off x="6570109" y="2746836"/>
+            <a:ext cx="189402" cy="199924"/>
+          </a:xfrm>
+          <a:prstGeom prst="line">
+            <a:avLst/>
+          </a:prstGeom>
+          <a:ln w="38100">
+            <a:solidFill>
+              <a:schemeClr val="tx1"/>
+            </a:solidFill>
+          </a:ln>
+        </p:spPr>
+        <p:style>
+          <a:lnRef idx="1">
+            <a:schemeClr val="accent1"/>
+          </a:lnRef>
+          <a:fillRef idx="0">
+            <a:schemeClr val="accent1"/>
+          </a:fillRef>
+          <a:effectRef idx="0">
+            <a:schemeClr val="accent1"/>
+          </a:effectRef>
+          <a:fontRef idx="minor">
+            <a:schemeClr val="tx1"/>
+          </a:fontRef>
+        </p:style>
+      </p:cxnSp>
+      <p:cxnSp>
+        <p:nvCxnSpPr>
+          <p:cNvPr id="75" name="Straight Connector 74"/>
+          <p:cNvCxnSpPr/>
+          <p:nvPr/>
+        </p:nvCxnSpPr>
+        <p:spPr>
+          <a:xfrm flipH="1" flipV="1">
+            <a:off x="6587069" y="2028926"/>
+            <a:ext cx="189402" cy="199924"/>
+          </a:xfrm>
+          <a:prstGeom prst="line">
+            <a:avLst/>
+          </a:prstGeom>
+          <a:ln w="38100">
+            <a:solidFill>
+              <a:schemeClr val="tx1"/>
+            </a:solidFill>
+          </a:ln>
+        </p:spPr>
+        <p:style>
+          <a:lnRef idx="1">
+            <a:schemeClr val="accent1"/>
+          </a:lnRef>
+          <a:fillRef idx="0">
+            <a:schemeClr val="accent1"/>
+          </a:fillRef>
+          <a:effectRef idx="0">
+            <a:schemeClr val="accent1"/>
+          </a:effectRef>
+          <a:fontRef idx="minor">
+            <a:schemeClr val="tx1"/>
+          </a:fontRef>
+        </p:style>
+      </p:cxnSp>
+      <p:pic>
+        <p:nvPicPr>
+          <p:cNvPr id="114" name="Picture 113"/>
+          <p:cNvPicPr>
+            <a:picLocks noChangeAspect="1"/>
+          </p:cNvPicPr>
+          <p:nvPr/>
+        </p:nvPicPr>
+        <p:blipFill>
+          <a:blip r:embed="rId10"/>
+          <a:stretch>
+            <a:fillRect/>
+          </a:stretch>
+        </p:blipFill>
+        <p:spPr>
+          <a:xfrm>
+            <a:off x="991926" y="2409545"/>
+            <a:ext cx="266700" cy="279400"/>
+          </a:xfrm>
+          <a:prstGeom prst="rect">
+            <a:avLst/>
+          </a:prstGeom>
+        </p:spPr>
+      </p:pic>
+      <p:pic>
+        <p:nvPicPr>
+          <p:cNvPr id="115" name="Picture 114"/>
+          <p:cNvPicPr>
+            <a:picLocks noChangeAspect="1"/>
+          </p:cNvPicPr>
+          <p:nvPr/>
+        </p:nvPicPr>
+        <p:blipFill>
+          <a:blip r:embed="rId11"/>
+          <a:stretch>
+            <a:fillRect/>
+          </a:stretch>
+        </p:blipFill>
+        <p:spPr>
+          <a:xfrm>
+            <a:off x="997514" y="2770197"/>
+            <a:ext cx="279400" cy="279400"/>
+          </a:xfrm>
+          <a:prstGeom prst="rect">
+            <a:avLst/>
+          </a:prstGeom>
+        </p:spPr>
+      </p:pic>
+      <p:pic>
+        <p:nvPicPr>
+          <p:cNvPr id="116" name="Picture 115"/>
+          <p:cNvPicPr>
+            <a:picLocks noChangeAspect="1"/>
+          </p:cNvPicPr>
+          <p:nvPr/>
+        </p:nvPicPr>
+        <p:blipFill>
+          <a:blip r:embed="rId12"/>
+          <a:stretch>
+            <a:fillRect/>
+          </a:stretch>
+        </p:blipFill>
+        <p:spPr>
+          <a:xfrm>
+            <a:off x="1036432" y="3778160"/>
+            <a:ext cx="279400" cy="330200"/>
+          </a:xfrm>
+          <a:prstGeom prst="rect">
+            <a:avLst/>
+          </a:prstGeom>
+        </p:spPr>
+      </p:pic>
+      <p:pic>
+        <p:nvPicPr>
+          <p:cNvPr id="117" name="Picture 116"/>
+          <p:cNvPicPr>
+            <a:picLocks noChangeAspect="1"/>
+          </p:cNvPicPr>
+          <p:nvPr/>
+        </p:nvPicPr>
+        <p:blipFill>
+          <a:blip r:embed="rId13"/>
+          <a:stretch>
+            <a:fillRect/>
+          </a:stretch>
+        </p:blipFill>
+        <p:spPr>
+          <a:xfrm>
+            <a:off x="1025056" y="3380914"/>
+            <a:ext cx="266700" cy="330200"/>
+          </a:xfrm>
+          <a:prstGeom prst="rect">
+            <a:avLst/>
+          </a:prstGeom>
+        </p:spPr>
+      </p:pic>
+      <p:cxnSp>
+        <p:nvCxnSpPr>
+          <p:cNvPr id="40" name="Straight Connector 39"/>
+          <p:cNvCxnSpPr/>
+          <p:nvPr/>
+        </p:nvCxnSpPr>
+        <p:spPr>
+          <a:xfrm flipH="1">
+            <a:off x="4217755" y="3696095"/>
+            <a:ext cx="1" cy="792152"/>
+          </a:xfrm>
+          <a:prstGeom prst="line">
+            <a:avLst/>
+          </a:prstGeom>
+          <a:ln w="38100">
+            <a:solidFill>
+              <a:schemeClr val="tx1"/>
+            </a:solidFill>
+          </a:ln>
+        </p:spPr>
+        <p:style>
+          <a:lnRef idx="1">
+            <a:schemeClr val="accent1"/>
+          </a:lnRef>
+          <a:fillRef idx="0">
+            <a:schemeClr val="accent1"/>
+          </a:fillRef>
+          <a:effectRef idx="0">
+            <a:schemeClr val="accent1"/>
+          </a:effectRef>
+          <a:fontRef idx="minor">
+            <a:schemeClr val="tx1"/>
+          </a:fontRef>
+        </p:style>
+      </p:cxnSp>
+      <p:cxnSp>
+        <p:nvCxnSpPr>
+          <p:cNvPr id="41" name="Straight Connector 40"/>
+          <p:cNvCxnSpPr/>
+          <p:nvPr/>
+        </p:nvCxnSpPr>
+        <p:spPr>
+          <a:xfrm flipH="1">
+            <a:off x="4129625" y="3589790"/>
+            <a:ext cx="169709" cy="229185"/>
+          </a:xfrm>
+          <a:prstGeom prst="line">
+            <a:avLst/>
+          </a:prstGeom>
+          <a:ln w="38100">
+            <a:solidFill>
+              <a:schemeClr val="tx1"/>
+            </a:solidFill>
+          </a:ln>
+        </p:spPr>
+        <p:style>
+          <a:lnRef idx="1">
+            <a:schemeClr val="accent1"/>
+          </a:lnRef>
+          <a:fillRef idx="0">
+            <a:schemeClr val="accent1"/>
+          </a:fillRef>
+          <a:effectRef idx="0">
+            <a:schemeClr val="accent1"/>
+          </a:effectRef>
+          <a:fontRef idx="minor">
+            <a:schemeClr val="tx1"/>
+          </a:fontRef>
+        </p:style>
+      </p:cxnSp>
+      <p:cxnSp>
+        <p:nvCxnSpPr>
+          <p:cNvPr id="43" name="Straight Connector 42"/>
+          <p:cNvCxnSpPr/>
+          <p:nvPr/>
+        </p:nvCxnSpPr>
+        <p:spPr>
+          <a:xfrm flipH="1">
+            <a:off x="4132900" y="4351131"/>
+            <a:ext cx="169709" cy="229185"/>
+          </a:xfrm>
+          <a:prstGeom prst="line">
+            <a:avLst/>
+          </a:prstGeom>
+          <a:ln w="38100">
+            <a:solidFill>
+              <a:schemeClr val="tx1"/>
+            </a:solidFill>
+          </a:ln>
+        </p:spPr>
+        <p:style>
+          <a:lnRef idx="1">
+            <a:schemeClr val="accent1"/>
+          </a:lnRef>
+          <a:fillRef idx="0">
+            <a:schemeClr val="accent1"/>
+          </a:fillRef>
+          <a:effectRef idx="0">
+            <a:schemeClr val="accent1"/>
+          </a:effectRef>
+          <a:fontRef idx="minor">
+            <a:schemeClr val="tx1"/>
+          </a:fontRef>
+        </p:style>
+      </p:cxnSp>
+      <p:cxnSp>
+        <p:nvCxnSpPr>
+          <p:cNvPr id="45" name="Straight Connector 44"/>
+          <p:cNvCxnSpPr/>
+          <p:nvPr/>
+        </p:nvCxnSpPr>
+        <p:spPr>
+          <a:xfrm flipH="1" flipV="1">
+            <a:off x="4109932" y="4368630"/>
+            <a:ext cx="189402" cy="199924"/>
+          </a:xfrm>
+          <a:prstGeom prst="line">
+            <a:avLst/>
+          </a:prstGeom>
+          <a:ln w="38100">
+            <a:solidFill>
+              <a:schemeClr val="tx1"/>
+            </a:solidFill>
+          </a:ln>
+        </p:spPr>
+        <p:style>
+          <a:lnRef idx="1">
+            <a:schemeClr val="accent1"/>
+          </a:lnRef>
+          <a:fillRef idx="0">
+            <a:schemeClr val="accent1"/>
+          </a:fillRef>
+          <a:effectRef idx="0">
+            <a:schemeClr val="accent1"/>
+          </a:effectRef>
+          <a:fontRef idx="minor">
+            <a:schemeClr val="tx1"/>
+          </a:fontRef>
+        </p:style>
+      </p:cxnSp>
+      <p:cxnSp>
+        <p:nvCxnSpPr>
+          <p:cNvPr id="46" name="Straight Connector 45"/>
+          <p:cNvCxnSpPr/>
+          <p:nvPr/>
+        </p:nvCxnSpPr>
+        <p:spPr>
+          <a:xfrm flipH="1" flipV="1">
+            <a:off x="4126892" y="3604420"/>
+            <a:ext cx="189402" cy="199924"/>
+          </a:xfrm>
+          <a:prstGeom prst="line">
+            <a:avLst/>
+          </a:prstGeom>
+          <a:ln w="38100">
+            <a:solidFill>
+              <a:schemeClr val="tx1"/>
+            </a:solidFill>
+          </a:ln>
+        </p:spPr>
+        <p:style>
+          <a:lnRef idx="1">
+            <a:schemeClr val="accent1"/>
+          </a:lnRef>
+          <a:fillRef idx="0">
+            <a:schemeClr val="accent1"/>
+          </a:fillRef>
+          <a:effectRef idx="0">
+            <a:schemeClr val="accent1"/>
+          </a:effectRef>
+          <a:fontRef idx="minor">
+            <a:schemeClr val="tx1"/>
+          </a:fontRef>
+        </p:style>
+      </p:cxnSp>
+      <p:sp>
+        <p:nvSpPr>
+          <p:cNvPr id="47" name="Rectangle 46"/>
+          <p:cNvSpPr/>
+          <p:nvPr/>
+        </p:nvSpPr>
+        <p:spPr>
+          <a:xfrm>
+            <a:off x="5716227" y="3818975"/>
+            <a:ext cx="732870" cy="830088"/>
+          </a:xfrm>
+          <a:prstGeom prst="rect">
+            <a:avLst/>
+          </a:prstGeom>
+          <a:solidFill>
+            <a:schemeClr val="bg1"/>
+          </a:solidFill>
+          <a:ln w="28575">
+            <a:solidFill>
+              <a:schemeClr val="tx1"/>
+            </a:solidFill>
+          </a:ln>
+        </p:spPr>
+        <p:style>
+          <a:lnRef idx="2">
+            <a:schemeClr val="accent1">
+              <a:shade val="50000"/>
+            </a:schemeClr>
+          </a:lnRef>
+          <a:fillRef idx="1">
+            <a:schemeClr val="accent1"/>
+          </a:fillRef>
+          <a:effectRef idx="0">
+            <a:schemeClr val="accent1"/>
+          </a:effectRef>
+          <a:fontRef idx="minor">
+            <a:schemeClr val="lt1"/>
+          </a:fontRef>
+        </p:style>
+        <p:txBody>
+          <a:bodyPr rtlCol="0" anchor="ctr"/>
+          <a:lstStyle/>
+          <a:p>
+            <a:pPr algn="ctr"/>
+            <a:endParaRPr lang="en-US"/>
+          </a:p>
+        </p:txBody>
+      </p:sp>
+      <p:pic>
+        <p:nvPicPr>
+          <p:cNvPr id="48" name="Picture 47"/>
+          <p:cNvPicPr>
+            <a:picLocks noChangeAspect="1"/>
+          </p:cNvPicPr>
+          <p:nvPr/>
+        </p:nvPicPr>
+        <p:blipFill>
+          <a:blip r:embed="rId9"/>
+          <a:stretch>
+            <a:fillRect/>
+          </a:stretch>
+        </p:blipFill>
+        <p:spPr>
+          <a:xfrm>
+            <a:off x="5837116" y="4146023"/>
+            <a:ext cx="457200" cy="215900"/>
+          </a:xfrm>
+          <a:prstGeom prst="rect">
+            <a:avLst/>
+          </a:prstGeom>
+        </p:spPr>
+      </p:pic>
+      <p:cxnSp>
+        <p:nvCxnSpPr>
+          <p:cNvPr id="49" name="Straight Connector 48"/>
+          <p:cNvCxnSpPr/>
+          <p:nvPr/>
+        </p:nvCxnSpPr>
+        <p:spPr>
+          <a:xfrm flipH="1">
+            <a:off x="6089849" y="4649062"/>
+            <a:ext cx="1" cy="458412"/>
+          </a:xfrm>
+          <a:prstGeom prst="line">
+            <a:avLst/>
+          </a:prstGeom>
+          <a:ln w="38100">
+            <a:solidFill>
+              <a:schemeClr val="tx1"/>
+            </a:solidFill>
+          </a:ln>
+        </p:spPr>
+        <p:style>
+          <a:lnRef idx="1">
+            <a:schemeClr val="accent1"/>
+          </a:lnRef>
+          <a:fillRef idx="0">
+            <a:schemeClr val="accent1"/>
+          </a:fillRef>
+          <a:effectRef idx="0">
+            <a:schemeClr val="accent1"/>
+          </a:effectRef>
+          <a:fontRef idx="minor">
+            <a:schemeClr val="tx1"/>
+          </a:fontRef>
+        </p:style>
+      </p:cxnSp>
+      <p:sp>
+        <p:nvSpPr>
+          <p:cNvPr id="10" name="Oval 9"/>
+          <p:cNvSpPr/>
+          <p:nvPr/>
+        </p:nvSpPr>
+        <p:spPr>
+          <a:xfrm>
+            <a:off x="6005892" y="5035387"/>
+            <a:ext cx="167913" cy="154723"/>
+          </a:xfrm>
+          <a:prstGeom prst="ellipse">
+            <a:avLst/>
+          </a:prstGeom>
+          <a:solidFill>
+            <a:schemeClr val="tx1"/>
+          </a:solidFill>
+          <a:ln>
+            <a:solidFill>
+              <a:schemeClr val="tx1"/>
+            </a:solidFill>
+          </a:ln>
+        </p:spPr>
+        <p:style>
+          <a:lnRef idx="2">
+            <a:schemeClr val="accent1">
+              <a:shade val="50000"/>
+            </a:schemeClr>
+          </a:lnRef>
+          <a:fillRef idx="1">
+            <a:schemeClr val="accent1"/>
+          </a:fillRef>
+          <a:effectRef idx="0">
+            <a:schemeClr val="accent1"/>
+          </a:effectRef>
+          <a:fontRef idx="minor">
+            <a:schemeClr val="lt1"/>
+          </a:fontRef>
+        </p:style>
+        <p:txBody>
+          <a:bodyPr rtlCol="0" anchor="ctr"/>
+          <a:lstStyle/>
+          <a:p>
+            <a:pPr algn="ctr"/>
+            <a:endParaRPr lang="en-US"/>
+          </a:p>
+        </p:txBody>
+      </p:sp>
+      <p:pic>
+        <p:nvPicPr>
+          <p:cNvPr id="55" name="Picture 54"/>
+          <p:cNvPicPr>
+            <a:picLocks noChangeAspect="1"/>
+          </p:cNvPicPr>
+          <p:nvPr/>
+        </p:nvPicPr>
+        <p:blipFill>
+          <a:blip r:embed="rId14"/>
+          <a:stretch>
+            <a:fillRect/>
+          </a:stretch>
+        </p:blipFill>
+        <p:spPr>
+          <a:xfrm>
+            <a:off x="1061908" y="4961510"/>
+            <a:ext cx="177800" cy="228600"/>
+          </a:xfrm>
+          <a:prstGeom prst="rect">
+            <a:avLst/>
+          </a:prstGeom>
+        </p:spPr>
+      </p:pic>
+      <p:pic>
+        <p:nvPicPr>
+          <p:cNvPr id="21" name="Picture 20"/>
+          <p:cNvPicPr>
+            <a:picLocks noChangeAspect="1"/>
+          </p:cNvPicPr>
+          <p:nvPr/>
+        </p:nvPicPr>
+        <p:blipFill>
+          <a:blip r:embed="rId15"/>
+          <a:stretch>
+            <a:fillRect/>
+          </a:stretch>
+        </p:blipFill>
+        <p:spPr>
+          <a:xfrm>
+            <a:off x="1041546" y="4251816"/>
+            <a:ext cx="292100" cy="241300"/>
+          </a:xfrm>
+          <a:prstGeom prst="rect">
+            <a:avLst/>
+          </a:prstGeom>
+        </p:spPr>
+      </p:pic>
+    </p:spTree>
+    <p:extLst>
+      <p:ext uri="{BB962C8B-B14F-4D97-AF65-F5344CB8AC3E}">
+        <p14:creationId xmlns:p14="http://schemas.microsoft.com/office/powerpoint/2010/main" val="522953099"/>
       </p:ext>
     </p:extLst>
   </p:cSld>

</xml_diff>